<commit_message>
prettyprinting() shows all three t-tests, beamer outline done, add dummy images, add final_data directory, add t-test data
</commit_message>
<xml_diff>
--- a/tex/beamer_dummy.pptx
+++ b/tex/beamer_dummy.pptx
@@ -5,18 +5,19 @@
     <p:sldMasterId id="2147483648" r:id="rId1"/>
   </p:sldMasterIdLst>
   <p:notesMasterIdLst>
-    <p:notesMasterId r:id="rId11"/>
+    <p:notesMasterId r:id="rId12"/>
   </p:notesMasterIdLst>
   <p:sldIdLst>
     <p:sldId id="256" r:id="rId2"/>
     <p:sldId id="257" r:id="rId3"/>
     <p:sldId id="261" r:id="rId4"/>
     <p:sldId id="258" r:id="rId5"/>
-    <p:sldId id="259" r:id="rId6"/>
-    <p:sldId id="264" r:id="rId7"/>
-    <p:sldId id="260" r:id="rId8"/>
-    <p:sldId id="262" r:id="rId9"/>
-    <p:sldId id="263" r:id="rId10"/>
+    <p:sldId id="265" r:id="rId6"/>
+    <p:sldId id="266" r:id="rId7"/>
+    <p:sldId id="264" r:id="rId8"/>
+    <p:sldId id="260" r:id="rId9"/>
+    <p:sldId id="262" r:id="rId10"/>
+    <p:sldId id="263" r:id="rId11"/>
   </p:sldIdLst>
   <p:sldSz cx="12192000" cy="6858000"/>
   <p:notesSz cx="6858000" cy="9144000"/>
@@ -115,6 +116,45 @@
       </a:defRPr>
     </a:lvl9pPr>
   </p:defaultTextStyle>
+  <p:extLst>
+    <p:ext uri="{521415D9-36F7-43E2-AB2F-B90AF26B5E84}">
+      <p14:sectionLst xmlns:p14="http://schemas.microsoft.com/office/powerpoint/2010/main">
+        <p14:section name="Default Section" id="{27B8BEA2-DFF2-3844-AACD-B217F1E399A0}">
+          <p14:sldIdLst>
+            <p14:sldId id="256"/>
+          </p14:sldIdLst>
+        </p14:section>
+        <p14:section name="Preliminaries" id="{B004B7CE-7284-FA4C-8B0A-422524DE549F}">
+          <p14:sldIdLst>
+            <p14:sldId id="257"/>
+          </p14:sldIdLst>
+        </p14:section>
+        <p14:section name="Method" id="{D71AB559-D5E2-A34D-8F04-5DB22E0AEC1A}">
+          <p14:sldIdLst>
+            <p14:sldId id="261"/>
+            <p14:sldId id="258"/>
+            <p14:sldId id="265"/>
+            <p14:sldId id="266"/>
+          </p14:sldIdLst>
+        </p14:section>
+        <p14:section name="Significance" id="{DB5782AC-978B-8F48-8890-4AA8073A8B48}">
+          <p14:sldIdLst>
+            <p14:sldId id="264"/>
+            <p14:sldId id="260"/>
+            <p14:sldId id="262"/>
+          </p14:sldIdLst>
+        </p14:section>
+        <p14:section name="Results" id="{1BEEDD45-8FF3-5D4E-A02E-D27E6B7E8DC0}">
+          <p14:sldIdLst>
+            <p14:sldId id="263"/>
+          </p14:sldIdLst>
+        </p14:section>
+      </p14:sectionLst>
+    </p:ext>
+    <p:ext uri="{EFAFB233-063F-42B5-8137-9DF3F51BA10A}">
+      <p15:sldGuideLst xmlns:p15="http://schemas.microsoft.com/office/powerpoint/2012/main"/>
+    </p:ext>
+  </p:extLst>
 </p:presentation>
 </file>
 
@@ -200,7 +240,7 @@
           <a:p>
             <a:fld id="{378784F7-526D-4149-AF51-1A6DAC4B30E2}" type="datetimeFigureOut">
               <a:rPr lang="en-GB" smtClean="0"/>
-              <a:t>14/06/2018</a:t>
+              <a:t>21/06/2018</a:t>
             </a:fld>
             <a:endParaRPr lang="en-GB"/>
           </a:p>
@@ -468,6 +508,180 @@
 </p:notesMaster>
 </file>
 
+<file path=ppt/notesSlides/notesSlide1.xml><?xml version="1.0" encoding="utf-8"?>
+<p:notes xmlns:a="http://schemas.openxmlformats.org/drawingml/2006/main" xmlns:r="http://schemas.openxmlformats.org/officeDocument/2006/relationships" xmlns:p="http://schemas.openxmlformats.org/presentationml/2006/main">
+  <p:cSld>
+    <p:spTree>
+      <p:nvGrpSpPr>
+        <p:cNvPr id="1" name=""/>
+        <p:cNvGrpSpPr/>
+        <p:nvPr/>
+      </p:nvGrpSpPr>
+      <p:grpSpPr>
+        <a:xfrm>
+          <a:off x="0" y="0"/>
+          <a:ext cx="0" cy="0"/>
+          <a:chOff x="0" y="0"/>
+          <a:chExt cx="0" cy="0"/>
+        </a:xfrm>
+      </p:grpSpPr>
+      <p:sp>
+        <p:nvSpPr>
+          <p:cNvPr id="2" name="Slide Image Placeholder 1"/>
+          <p:cNvSpPr>
+            <a:spLocks noGrp="1" noRot="1" noChangeAspect="1"/>
+          </p:cNvSpPr>
+          <p:nvPr>
+            <p:ph type="sldImg"/>
+          </p:nvPr>
+        </p:nvSpPr>
+        <p:spPr/>
+      </p:sp>
+      <p:sp>
+        <p:nvSpPr>
+          <p:cNvPr id="3" name="Notes Placeholder 2"/>
+          <p:cNvSpPr>
+            <a:spLocks noGrp="1"/>
+          </p:cNvSpPr>
+          <p:nvPr>
+            <p:ph type="body" idx="1"/>
+          </p:nvPr>
+        </p:nvSpPr>
+        <p:spPr/>
+        <p:txBody>
+          <a:bodyPr/>
+          <a:lstStyle/>
+          <a:p>
+            <a:r>
+              <a:rPr lang="en-GB" dirty="0"/>
+              <a:t>add reference</a:t>
+            </a:r>
+          </a:p>
+        </p:txBody>
+      </p:sp>
+      <p:sp>
+        <p:nvSpPr>
+          <p:cNvPr id="4" name="Slide Number Placeholder 3"/>
+          <p:cNvSpPr>
+            <a:spLocks noGrp="1"/>
+          </p:cNvSpPr>
+          <p:nvPr>
+            <p:ph type="sldNum" sz="quarter" idx="10"/>
+          </p:nvPr>
+        </p:nvSpPr>
+        <p:spPr/>
+        <p:txBody>
+          <a:bodyPr/>
+          <a:lstStyle/>
+          <a:p>
+            <a:fld id="{2A6D38AD-DC69-7A49-A3BA-49389EBC1442}" type="slidenum">
+              <a:rPr lang="en-GB" smtClean="0"/>
+              <a:t>5</a:t>
+            </a:fld>
+            <a:endParaRPr lang="en-GB"/>
+          </a:p>
+        </p:txBody>
+      </p:sp>
+    </p:spTree>
+    <p:extLst>
+      <p:ext uri="{BB962C8B-B14F-4D97-AF65-F5344CB8AC3E}">
+        <p14:creationId xmlns:p14="http://schemas.microsoft.com/office/powerpoint/2010/main" val="370206976"/>
+      </p:ext>
+    </p:extLst>
+  </p:cSld>
+  <p:clrMapOvr>
+    <a:masterClrMapping/>
+  </p:clrMapOvr>
+</p:notes>
+</file>
+
+<file path=ppt/notesSlides/notesSlide2.xml><?xml version="1.0" encoding="utf-8"?>
+<p:notes xmlns:a="http://schemas.openxmlformats.org/drawingml/2006/main" xmlns:r="http://schemas.openxmlformats.org/officeDocument/2006/relationships" xmlns:p="http://schemas.openxmlformats.org/presentationml/2006/main">
+  <p:cSld>
+    <p:spTree>
+      <p:nvGrpSpPr>
+        <p:cNvPr id="1" name=""/>
+        <p:cNvGrpSpPr/>
+        <p:nvPr/>
+      </p:nvGrpSpPr>
+      <p:grpSpPr>
+        <a:xfrm>
+          <a:off x="0" y="0"/>
+          <a:ext cx="0" cy="0"/>
+          <a:chOff x="0" y="0"/>
+          <a:chExt cx="0" cy="0"/>
+        </a:xfrm>
+      </p:grpSpPr>
+      <p:sp>
+        <p:nvSpPr>
+          <p:cNvPr id="2" name="Slide Image Placeholder 1"/>
+          <p:cNvSpPr>
+            <a:spLocks noGrp="1" noRot="1" noChangeAspect="1"/>
+          </p:cNvSpPr>
+          <p:nvPr>
+            <p:ph type="sldImg"/>
+          </p:nvPr>
+        </p:nvSpPr>
+        <p:spPr/>
+      </p:sp>
+      <p:sp>
+        <p:nvSpPr>
+          <p:cNvPr id="3" name="Notes Placeholder 2"/>
+          <p:cNvSpPr>
+            <a:spLocks noGrp="1"/>
+          </p:cNvSpPr>
+          <p:nvPr>
+            <p:ph type="body" idx="1"/>
+          </p:nvPr>
+        </p:nvSpPr>
+        <p:spPr/>
+        <p:txBody>
+          <a:bodyPr/>
+          <a:lstStyle/>
+          <a:p>
+            <a:r>
+              <a:rPr lang="en-GB" dirty="0"/>
+              <a:t>Beamer resolution high enough?</a:t>
+            </a:r>
+          </a:p>
+        </p:txBody>
+      </p:sp>
+      <p:sp>
+        <p:nvSpPr>
+          <p:cNvPr id="4" name="Slide Number Placeholder 3"/>
+          <p:cNvSpPr>
+            <a:spLocks noGrp="1"/>
+          </p:cNvSpPr>
+          <p:nvPr>
+            <p:ph type="sldNum" sz="quarter" idx="10"/>
+          </p:nvPr>
+        </p:nvSpPr>
+        <p:spPr/>
+        <p:txBody>
+          <a:bodyPr/>
+          <a:lstStyle/>
+          <a:p>
+            <a:fld id="{2A6D38AD-DC69-7A49-A3BA-49389EBC1442}" type="slidenum">
+              <a:rPr lang="en-GB" smtClean="0"/>
+              <a:t>8</a:t>
+            </a:fld>
+            <a:endParaRPr lang="en-GB"/>
+          </a:p>
+        </p:txBody>
+      </p:sp>
+    </p:spTree>
+    <p:extLst>
+      <p:ext uri="{BB962C8B-B14F-4D97-AF65-F5344CB8AC3E}">
+        <p14:creationId xmlns:p14="http://schemas.microsoft.com/office/powerpoint/2010/main" val="2393998150"/>
+      </p:ext>
+    </p:extLst>
+  </p:cSld>
+  <p:clrMapOvr>
+    <a:masterClrMapping/>
+  </p:clrMapOvr>
+</p:notes>
+</file>
+
 <file path=ppt/slideLayouts/slideLayout1.xml><?xml version="1.0" encoding="utf-8"?>
 <p:sldLayout xmlns:a="http://schemas.openxmlformats.org/drawingml/2006/main" xmlns:r="http://schemas.openxmlformats.org/officeDocument/2006/relationships" xmlns:p="http://schemas.openxmlformats.org/presentationml/2006/main" type="title" preserve="1">
   <p:cSld name="Title Slide">
@@ -617,7 +831,7 @@
           <a:p>
             <a:fld id="{FEDDAF97-E3AB-F842-83A9-531D38A617F6}" type="datetime1">
               <a:rPr lang="en-US" smtClean="0"/>
-              <a:t>6/14/18</a:t>
+              <a:t>6/21/18</a:t>
             </a:fld>
             <a:endParaRPr lang="en-GB"/>
           </a:p>
@@ -817,7 +1031,7 @@
           <a:p>
             <a:fld id="{C555869C-9A68-DC42-8482-E96EC059EADF}" type="datetime1">
               <a:rPr lang="en-US" smtClean="0"/>
-              <a:t>6/14/18</a:t>
+              <a:t>6/21/18</a:t>
             </a:fld>
             <a:endParaRPr lang="en-GB"/>
           </a:p>
@@ -1027,7 +1241,7 @@
           <a:p>
             <a:fld id="{F25796D2-A300-164E-80BD-7DEAF2F05771}" type="datetime1">
               <a:rPr lang="en-US" smtClean="0"/>
-              <a:t>6/14/18</a:t>
+              <a:t>6/21/18</a:t>
             </a:fld>
             <a:endParaRPr lang="en-GB"/>
           </a:p>
@@ -1227,7 +1441,7 @@
           <a:p>
             <a:fld id="{D0A2CBBA-01E2-DE43-9E4F-45520AD7E498}" type="datetime1">
               <a:rPr lang="en-US" smtClean="0"/>
-              <a:t>6/14/18</a:t>
+              <a:t>6/21/18</a:t>
             </a:fld>
             <a:endParaRPr lang="en-GB"/>
           </a:p>
@@ -1503,7 +1717,7 @@
           <a:p>
             <a:fld id="{2C6C35FC-1C72-F64D-94AB-D22ED6195775}" type="datetime1">
               <a:rPr lang="en-US" smtClean="0"/>
-              <a:t>6/14/18</a:t>
+              <a:t>6/21/18</a:t>
             </a:fld>
             <a:endParaRPr lang="en-GB"/>
           </a:p>
@@ -1771,7 +1985,7 @@
           <a:p>
             <a:fld id="{32352EA9-A3A0-9640-A46C-92A37C853BD6}" type="datetime1">
               <a:rPr lang="en-US" smtClean="0"/>
-              <a:t>6/14/18</a:t>
+              <a:t>6/21/18</a:t>
             </a:fld>
             <a:endParaRPr lang="en-GB"/>
           </a:p>
@@ -2186,7 +2400,7 @@
           <a:p>
             <a:fld id="{DFBDA83A-6D79-4C4A-94BB-70606A25C158}" type="datetime1">
               <a:rPr lang="en-US" smtClean="0"/>
-              <a:t>6/14/18</a:t>
+              <a:t>6/21/18</a:t>
             </a:fld>
             <a:endParaRPr lang="en-GB"/>
           </a:p>
@@ -2328,7 +2542,7 @@
           <a:p>
             <a:fld id="{847C67F8-6967-AD49-8879-91AC00F32F37}" type="datetime1">
               <a:rPr lang="en-US" smtClean="0"/>
-              <a:t>6/14/18</a:t>
+              <a:t>6/21/18</a:t>
             </a:fld>
             <a:endParaRPr lang="en-GB"/>
           </a:p>
@@ -2441,7 +2655,7 @@
           <a:p>
             <a:fld id="{182236D1-466F-7140-B12A-6E8BBB168EB5}" type="datetime1">
               <a:rPr lang="en-US" smtClean="0"/>
-              <a:t>6/14/18</a:t>
+              <a:t>6/21/18</a:t>
             </a:fld>
             <a:endParaRPr lang="en-GB"/>
           </a:p>
@@ -2754,7 +2968,7 @@
           <a:p>
             <a:fld id="{FBD6C9AB-AE04-6B48-8CC7-DCDD928195A0}" type="datetime1">
               <a:rPr lang="en-US" smtClean="0"/>
-              <a:t>6/14/18</a:t>
+              <a:t>6/21/18</a:t>
             </a:fld>
             <a:endParaRPr lang="en-GB"/>
           </a:p>
@@ -3043,7 +3257,7 @@
           <a:p>
             <a:fld id="{D3C9C90C-FFF2-5A46-B66D-E196B449A2E0}" type="datetime1">
               <a:rPr lang="en-US" smtClean="0"/>
-              <a:t>6/14/18</a:t>
+              <a:t>6/21/18</a:t>
             </a:fld>
             <a:endParaRPr lang="en-GB"/>
           </a:p>
@@ -3286,7 +3500,7 @@
           <a:p>
             <a:fld id="{D7B58730-6947-3D41-9097-D76AE248D51D}" type="datetime1">
               <a:rPr lang="en-US" smtClean="0"/>
-              <a:t>6/14/18</a:t>
+              <a:t>6/21/18</a:t>
             </a:fld>
             <a:endParaRPr lang="en-GB"/>
           </a:p>
@@ -3773,6 +3987,142 @@
 </p:sld>
 </file>
 
+<file path=ppt/slides/slide10.xml><?xml version="1.0" encoding="utf-8"?>
+<p:sld xmlns:a="http://schemas.openxmlformats.org/drawingml/2006/main" xmlns:r="http://schemas.openxmlformats.org/officeDocument/2006/relationships" xmlns:p="http://schemas.openxmlformats.org/presentationml/2006/main">
+  <p:cSld>
+    <p:spTree>
+      <p:nvGrpSpPr>
+        <p:cNvPr id="1" name=""/>
+        <p:cNvGrpSpPr/>
+        <p:nvPr/>
+      </p:nvGrpSpPr>
+      <p:grpSpPr>
+        <a:xfrm>
+          <a:off x="0" y="0"/>
+          <a:ext cx="0" cy="0"/>
+          <a:chOff x="0" y="0"/>
+          <a:chExt cx="0" cy="0"/>
+        </a:xfrm>
+      </p:grpSpPr>
+      <p:sp>
+        <p:nvSpPr>
+          <p:cNvPr id="2" name="Title 1">
+            <a:extLst>
+              <a:ext uri="{FF2B5EF4-FFF2-40B4-BE49-F238E27FC236}">
+                <a16:creationId xmlns:a16="http://schemas.microsoft.com/office/drawing/2014/main" id="{B59301A2-9C61-8C4D-ACB8-F7A1CDCDAC91}"/>
+              </a:ext>
+            </a:extLst>
+          </p:cNvPr>
+          <p:cNvSpPr>
+            <a:spLocks noGrp="1"/>
+          </p:cNvSpPr>
+          <p:nvPr>
+            <p:ph type="title"/>
+          </p:nvPr>
+        </p:nvSpPr>
+        <p:spPr/>
+        <p:txBody>
+          <a:bodyPr/>
+          <a:lstStyle/>
+          <a:p>
+            <a:r>
+              <a:rPr lang="en-GB" dirty="0"/>
+              <a:t>Results</a:t>
+            </a:r>
+          </a:p>
+        </p:txBody>
+      </p:sp>
+      <p:sp>
+        <p:nvSpPr>
+          <p:cNvPr id="3" name="Content Placeholder 2">
+            <a:extLst>
+              <a:ext uri="{FF2B5EF4-FFF2-40B4-BE49-F238E27FC236}">
+                <a16:creationId xmlns:a16="http://schemas.microsoft.com/office/drawing/2014/main" id="{CAF45B0D-B8E5-E449-A666-D3C6BC5ECD3C}"/>
+              </a:ext>
+            </a:extLst>
+          </p:cNvPr>
+          <p:cNvSpPr>
+            <a:spLocks noGrp="1"/>
+          </p:cNvSpPr>
+          <p:nvPr>
+            <p:ph idx="1"/>
+          </p:nvPr>
+        </p:nvSpPr>
+        <p:spPr/>
+        <p:txBody>
+          <a:bodyPr/>
+          <a:lstStyle/>
+          <a:p>
+            <a:r>
+              <a:rPr lang="en-GB" dirty="0"/>
+              <a:t>numerical vs applied significance</a:t>
+            </a:r>
+          </a:p>
+          <a:p>
+            <a:endParaRPr lang="en-GB" dirty="0"/>
+          </a:p>
+          <a:p>
+            <a:r>
+              <a:rPr lang="en-GB" dirty="0"/>
+              <a:t>rules confirming existing research</a:t>
+            </a:r>
+          </a:p>
+          <a:p>
+            <a:r>
+              <a:rPr lang="en-GB" dirty="0"/>
+              <a:t>new ”interesting” rules (whatever that means)</a:t>
+            </a:r>
+          </a:p>
+          <a:p>
+            <a:r>
+              <a:rPr lang="en-GB" dirty="0"/>
+              <a:t>possible hypotheses generated from new rules</a:t>
+            </a:r>
+          </a:p>
+        </p:txBody>
+      </p:sp>
+      <p:sp>
+        <p:nvSpPr>
+          <p:cNvPr id="4" name="Slide Number Placeholder 3">
+            <a:extLst>
+              <a:ext uri="{FF2B5EF4-FFF2-40B4-BE49-F238E27FC236}">
+                <a16:creationId xmlns:a16="http://schemas.microsoft.com/office/drawing/2014/main" id="{92C00CBE-9A88-CC4A-9788-916F84EDDFCB}"/>
+              </a:ext>
+            </a:extLst>
+          </p:cNvPr>
+          <p:cNvSpPr>
+            <a:spLocks noGrp="1"/>
+          </p:cNvSpPr>
+          <p:nvPr>
+            <p:ph type="sldNum" sz="quarter" idx="12"/>
+          </p:nvPr>
+        </p:nvSpPr>
+        <p:spPr/>
+        <p:txBody>
+          <a:bodyPr/>
+          <a:lstStyle/>
+          <a:p>
+            <a:fld id="{1EF241A2-0DEB-384D-A4D9-E11D0A62C4FD}" type="slidenum">
+              <a:rPr lang="en-GB" smtClean="0"/>
+              <a:t>10</a:t>
+            </a:fld>
+            <a:endParaRPr lang="en-GB" dirty="0"/>
+          </a:p>
+        </p:txBody>
+      </p:sp>
+    </p:spTree>
+    <p:extLst>
+      <p:ext uri="{BB962C8B-B14F-4D97-AF65-F5344CB8AC3E}">
+        <p14:creationId xmlns:p14="http://schemas.microsoft.com/office/powerpoint/2010/main" val="3418532346"/>
+      </p:ext>
+    </p:extLst>
+  </p:cSld>
+  <p:clrMapOvr>
+    <a:masterClrMapping/>
+  </p:clrMapOvr>
+</p:sld>
+</file>
+
 <file path=ppt/slides/slide2.xml><?xml version="1.0" encoding="utf-8"?>
 <p:sld xmlns:a="http://schemas.openxmlformats.org/drawingml/2006/main" xmlns:r="http://schemas.openxmlformats.org/officeDocument/2006/relationships" xmlns:p="http://schemas.openxmlformats.org/presentationml/2006/main">
   <p:cSld>
@@ -3831,12 +4181,12 @@
             <a:spLocks noGrp="1"/>
           </p:cNvSpPr>
           <p:nvPr>
-            <p:ph idx="1"/>
-          </p:nvPr>
-        </p:nvSpPr>
-        <p:spPr/>
-        <p:txBody>
-          <a:bodyPr/>
+            <p:ph sz="half" idx="1"/>
+          </p:nvPr>
+        </p:nvSpPr>
+        <p:spPr/>
+        <p:txBody>
+          <a:bodyPr anchor="ctr"/>
           <a:lstStyle/>
           <a:p>
             <a:r>
@@ -3851,27 +4201,6 @@
             </a:r>
           </a:p>
           <a:p>
-            <a:pPr lvl="1"/>
-            <a:r>
-              <a:rPr lang="en-GB" dirty="0"/>
-              <a:t>Why do we care?</a:t>
-            </a:r>
-            <a:br>
-              <a:rPr lang="en-GB" dirty="0"/>
-            </a:br>
-            <a:r>
-              <a:rPr lang="en-GB" dirty="0"/>
-              <a:t>Fundamental to human interaction</a:t>
-            </a:r>
-            <a:br>
-              <a:rPr lang="en-GB" dirty="0"/>
-            </a:br>
-            <a:r>
-              <a:rPr lang="en-GB" dirty="0"/>
-              <a:t>also in other species</a:t>
-            </a:r>
-          </a:p>
-          <a:p>
             <a:r>
               <a:rPr lang="en-GB" dirty="0" err="1"/>
               <a:t>uni</a:t>
@@ -3881,19 +4210,37 @@
               <a:t>- vs multimodal</a:t>
             </a:r>
           </a:p>
-          <a:p>
-            <a:pPr lvl="1"/>
-            <a:r>
-              <a:rPr lang="en-GB" dirty="0"/>
-              <a:t>Why would turn-taking be multimodal?</a:t>
-            </a:r>
-          </a:p>
-          <a:p>
-            <a:pPr lvl="1"/>
-            <a:endParaRPr lang="en-GB" dirty="0"/>
-          </a:p>
-        </p:txBody>
-      </p:sp>
+        </p:txBody>
+      </p:sp>
+      <p:pic>
+        <p:nvPicPr>
+          <p:cNvPr id="7" name="Content Placeholder 6">
+            <a:extLst>
+              <a:ext uri="{FF2B5EF4-FFF2-40B4-BE49-F238E27FC236}">
+                <a16:creationId xmlns:a16="http://schemas.microsoft.com/office/drawing/2014/main" id="{60C9382E-9973-4445-A58D-B73ABF2E5E7C}"/>
+              </a:ext>
+            </a:extLst>
+          </p:cNvPr>
+          <p:cNvPicPr>
+            <a:picLocks noGrp="1" noChangeAspect="1"/>
+          </p:cNvPicPr>
+          <p:nvPr>
+            <p:ph sz="half" idx="2"/>
+          </p:nvPr>
+        </p:nvPicPr>
+        <p:blipFill>
+          <a:blip r:embed="rId2"/>
+          <a:stretch>
+            <a:fillRect/>
+          </a:stretch>
+        </p:blipFill>
+        <p:spPr>
+          <a:xfrm>
+            <a:off x="6172200" y="2983785"/>
+            <a:ext cx="5181600" cy="2035017"/>
+          </a:xfrm>
+        </p:spPr>
+      </p:pic>
       <p:sp>
         <p:nvSpPr>
           <p:cNvPr id="4" name="Slide Number Placeholder 3">
@@ -3981,40 +4328,35 @@
           </a:p>
         </p:txBody>
       </p:sp>
-      <p:sp>
-        <p:nvSpPr>
-          <p:cNvPr id="3" name="Content Placeholder 2">
-            <a:extLst>
-              <a:ext uri="{FF2B5EF4-FFF2-40B4-BE49-F238E27FC236}">
-                <a16:creationId xmlns:a16="http://schemas.microsoft.com/office/drawing/2014/main" id="{CAF45B0D-B8E5-E449-A666-D3C6BC5ECD3C}"/>
-              </a:ext>
-            </a:extLst>
-          </p:cNvPr>
-          <p:cNvSpPr>
-            <a:spLocks noGrp="1"/>
-          </p:cNvSpPr>
+      <p:pic>
+        <p:nvPicPr>
+          <p:cNvPr id="6" name="Content Placeholder 5">
+            <a:extLst>
+              <a:ext uri="{FF2B5EF4-FFF2-40B4-BE49-F238E27FC236}">
+                <a16:creationId xmlns:a16="http://schemas.microsoft.com/office/drawing/2014/main" id="{6AD28C7D-4034-144A-9CDE-EE778133FAFE}"/>
+              </a:ext>
+            </a:extLst>
+          </p:cNvPr>
+          <p:cNvPicPr>
+            <a:picLocks noGrp="1" noChangeAspect="1"/>
+          </p:cNvPicPr>
           <p:nvPr>
             <p:ph idx="1"/>
           </p:nvPr>
-        </p:nvSpPr>
-        <p:spPr/>
-        <p:txBody>
-          <a:bodyPr/>
-          <a:lstStyle/>
-          <a:p>
-            <a:r>
-              <a:rPr lang="en-GB" dirty="0"/>
-              <a:t>video ≤ 15 seconds</a:t>
-            </a:r>
-          </a:p>
-          <a:p>
-            <a:r>
-              <a:rPr lang="en-GB" dirty="0"/>
-              <a:t>explain setup</a:t>
-            </a:r>
-          </a:p>
-        </p:txBody>
-      </p:sp>
+        </p:nvPicPr>
+        <p:blipFill>
+          <a:blip r:embed="rId2"/>
+          <a:stretch>
+            <a:fillRect/>
+          </a:stretch>
+        </p:blipFill>
+        <p:spPr>
+          <a:xfrm>
+            <a:off x="2238398" y="1825625"/>
+            <a:ext cx="7715203" cy="4351338"/>
+          </a:xfrm>
+        </p:spPr>
+      </p:pic>
       <p:sp>
         <p:nvSpPr>
           <p:cNvPr id="4" name="Slide Number Placeholder 3">
@@ -4102,40 +4444,34 @@
           </a:p>
         </p:txBody>
       </p:sp>
-      <p:sp>
-        <p:nvSpPr>
-          <p:cNvPr id="3" name="Content Placeholder 2">
-            <a:extLst>
-              <a:ext uri="{FF2B5EF4-FFF2-40B4-BE49-F238E27FC236}">
-                <a16:creationId xmlns:a16="http://schemas.microsoft.com/office/drawing/2014/main" id="{CAF45B0D-B8E5-E449-A666-D3C6BC5ECD3C}"/>
-              </a:ext>
-            </a:extLst>
-          </p:cNvPr>
-          <p:cNvSpPr>
-            <a:spLocks noGrp="1"/>
-          </p:cNvSpPr>
+      <p:pic>
+        <p:nvPicPr>
+          <p:cNvPr id="6" name="Content Placeholder 5">
+            <a:extLst>
+              <a:ext uri="{FF2B5EF4-FFF2-40B4-BE49-F238E27FC236}">
+                <a16:creationId xmlns:a16="http://schemas.microsoft.com/office/drawing/2014/main" id="{A2207589-2245-7C41-9766-10AD111B4AA6}"/>
+              </a:ext>
+            </a:extLst>
+          </p:cNvPr>
+          <p:cNvPicPr>
+            <a:picLocks noGrp="1" noChangeAspect="1"/>
+          </p:cNvPicPr>
           <p:nvPr>
             <p:ph idx="1"/>
           </p:nvPr>
-        </p:nvSpPr>
-        <p:spPr/>
-        <p:txBody>
-          <a:bodyPr/>
-          <a:lstStyle/>
-          <a:p>
-            <a:r>
-              <a:rPr lang="en-GB" dirty="0"/>
-              <a:t>explain annotated categories</a:t>
-            </a:r>
-          </a:p>
-          <a:p>
-            <a:r>
-              <a:rPr lang="en-GB" dirty="0"/>
-              <a:t>ELAN screenshot</a:t>
-            </a:r>
-          </a:p>
-        </p:txBody>
-      </p:sp>
+        </p:nvPicPr>
+        <p:blipFill rotWithShape="1">
+          <a:blip r:embed="rId2"/>
+          <a:srcRect r="51698"/>
+          <a:stretch/>
+        </p:blipFill>
+        <p:spPr>
+          <a:xfrm>
+            <a:off x="831892" y="2299381"/>
+            <a:ext cx="10528216" cy="3448276"/>
+          </a:xfrm>
+        </p:spPr>
+      </p:pic>
       <p:sp>
         <p:nvSpPr>
           <p:cNvPr id="5" name="Slide Number Placeholder 4">
@@ -4218,7 +4554,7 @@
           <a:p>
             <a:r>
               <a:rPr lang="en-GB" dirty="0"/>
-              <a:t>Method</a:t>
+              <a:t>Method – What counts as a rule?</a:t>
             </a:r>
           </a:p>
         </p:txBody>
@@ -4236,40 +4572,101 @@
             <a:spLocks noGrp="1"/>
           </p:cNvSpPr>
           <p:nvPr>
-            <p:ph idx="1"/>
-          </p:nvPr>
-        </p:nvSpPr>
-        <p:spPr/>
-        <p:txBody>
-          <a:bodyPr/>
-          <a:lstStyle/>
-          <a:p>
+            <p:ph sz="half" idx="1"/>
+          </p:nvPr>
+        </p:nvSpPr>
+        <p:spPr/>
+        <p:txBody>
+          <a:bodyPr/>
+          <a:lstStyle/>
+          <a:p>
+            <a:pPr marL="0" indent="0">
+              <a:buNone/>
+            </a:pPr>
             <a:r>
               <a:rPr lang="en-GB" dirty="0"/>
-              <a:t>explain FPM-approach</a:t>
-            </a:r>
-          </a:p>
-          <a:p>
-            <a:pPr lvl="1"/>
-            <a:r>
-              <a:rPr lang="en-GB" dirty="0"/>
-              <a:t>only get as mathematical as you’re really comfortable with</a:t>
-            </a:r>
-          </a:p>
-          <a:p>
-            <a:r>
-              <a:rPr lang="en-GB" dirty="0"/>
-              <a:t>give example rules (confirming established knowledge?)</a:t>
-            </a:r>
-          </a:p>
-          <a:p>
-            <a:r>
-              <a:rPr lang="en-GB" dirty="0"/>
-              <a:t>if possible: video section where the example rule occurs</a:t>
-            </a:r>
-          </a:p>
-        </p:txBody>
-      </p:sp>
+              <a:t>A </a:t>
+            </a:r>
+            <a:r>
+              <a:rPr lang="en-GB" dirty="0">
+                <a:sym typeface="Wingdings" pitchFamily="2" charset="2"/>
+              </a:rPr>
+              <a:t> B represents one of two cases:</a:t>
+            </a:r>
+          </a:p>
+          <a:p>
+            <a:r>
+              <a:rPr lang="en-GB" dirty="0">
+                <a:sym typeface="Wingdings" pitchFamily="2" charset="2"/>
+              </a:rPr>
+              <a:t>interval of A starts before Interval of B</a:t>
+            </a:r>
+          </a:p>
+          <a:p>
+            <a:r>
+              <a:rPr lang="en-GB" dirty="0">
+                <a:sym typeface="Wingdings" pitchFamily="2" charset="2"/>
+              </a:rPr>
+              <a:t>interval of A and B start at the same time</a:t>
+            </a:r>
+          </a:p>
+          <a:p>
+            <a:r>
+              <a:rPr lang="en-GB" b="1" dirty="0">
+                <a:sym typeface="Wingdings" pitchFamily="2" charset="2"/>
+              </a:rPr>
+              <a:t>and</a:t>
+            </a:r>
+            <a:r>
+              <a:rPr lang="en-GB" dirty="0">
+                <a:sym typeface="Wingdings" pitchFamily="2" charset="2"/>
+              </a:rPr>
+              <a:t> A ends after B begins</a:t>
+            </a:r>
+            <a:br>
+              <a:rPr lang="en-GB" dirty="0">
+                <a:sym typeface="Wingdings" pitchFamily="2" charset="2"/>
+              </a:rPr>
+            </a:br>
+            <a:r>
+              <a:rPr lang="en-GB" dirty="0">
+                <a:sym typeface="Wingdings" pitchFamily="2" charset="2"/>
+              </a:rPr>
+              <a:t>(= overlap)</a:t>
+            </a:r>
+            <a:endParaRPr lang="en-GB" dirty="0"/>
+          </a:p>
+        </p:txBody>
+      </p:sp>
+      <p:pic>
+        <p:nvPicPr>
+          <p:cNvPr id="11" name="Content Placeholder 10">
+            <a:extLst>
+              <a:ext uri="{FF2B5EF4-FFF2-40B4-BE49-F238E27FC236}">
+                <a16:creationId xmlns:a16="http://schemas.microsoft.com/office/drawing/2014/main" id="{A0C972E2-6103-724C-8A41-FC51312CF6E6}"/>
+              </a:ext>
+            </a:extLst>
+          </p:cNvPr>
+          <p:cNvPicPr>
+            <a:picLocks noGrp="1" noChangeAspect="1"/>
+          </p:cNvPicPr>
+          <p:nvPr>
+            <p:ph sz="half" idx="2"/>
+          </p:nvPr>
+        </p:nvPicPr>
+        <p:blipFill>
+          <a:blip r:embed="rId3"/>
+          <a:stretch>
+            <a:fillRect/>
+          </a:stretch>
+        </p:blipFill>
+        <p:spPr>
+          <a:xfrm>
+            <a:off x="6172200" y="2453581"/>
+            <a:ext cx="5181600" cy="2076521"/>
+          </a:xfrm>
+        </p:spPr>
+      </p:pic>
       <p:sp>
         <p:nvSpPr>
           <p:cNvPr id="4" name="Slide Number Placeholder 3">
@@ -4302,7 +4699,7 @@
     </p:spTree>
     <p:extLst>
       <p:ext uri="{BB962C8B-B14F-4D97-AF65-F5344CB8AC3E}">
-        <p14:creationId xmlns:p14="http://schemas.microsoft.com/office/powerpoint/2010/main" val="1487900191"/>
+        <p14:creationId xmlns:p14="http://schemas.microsoft.com/office/powerpoint/2010/main" val="41375712"/>
       </p:ext>
     </p:extLst>
   </p:cSld>
@@ -4352,74 +4749,223 @@
           <a:p>
             <a:r>
               <a:rPr lang="en-GB" dirty="0"/>
-              <a:t>Significance</a:t>
-            </a:r>
-          </a:p>
-        </p:txBody>
-      </p:sp>
-      <p:sp>
-        <p:nvSpPr>
-          <p:cNvPr id="4" name="Content Placeholder 3">
-            <a:extLst>
-              <a:ext uri="{FF2B5EF4-FFF2-40B4-BE49-F238E27FC236}">
-                <a16:creationId xmlns:a16="http://schemas.microsoft.com/office/drawing/2014/main" id="{709BAD3A-656F-5846-8CE2-956D751B68D6}"/>
-              </a:ext>
-            </a:extLst>
-          </p:cNvPr>
-          <p:cNvSpPr>
-            <a:spLocks noGrp="1"/>
-          </p:cNvSpPr>
-          <p:nvPr>
-            <p:ph idx="1"/>
-          </p:nvPr>
-        </p:nvSpPr>
-        <p:spPr/>
-        <p:txBody>
-          <a:bodyPr/>
-          <a:lstStyle/>
-          <a:p>
-            <a:r>
-              <a:rPr lang="en-GB" dirty="0"/>
-              <a:t>What’s the point?</a:t>
-            </a:r>
-          </a:p>
-          <a:p>
-            <a:pPr lvl="1"/>
-            <a:r>
-              <a:rPr lang="en-GB" dirty="0"/>
-              <a:t>choose “interesting” rules more objectively</a:t>
-            </a:r>
-          </a:p>
-          <a:p>
-            <a:pPr lvl="1"/>
-            <a:r>
-              <a:rPr lang="en-GB" dirty="0"/>
-              <a:t>numerical (=objective) support for subjectively deciding what’s “interesting”</a:t>
-            </a:r>
-          </a:p>
-          <a:p>
-            <a:r>
-              <a:rPr lang="en-GB" dirty="0"/>
-              <a:t>explain how significance was established</a:t>
-            </a:r>
-          </a:p>
-          <a:p>
-            <a:r>
-              <a:rPr lang="en-GB" dirty="0"/>
-              <a:t>3 metrics: “confidence”, # of occurrences, duration</a:t>
-            </a:r>
-          </a:p>
-          <a:p>
-            <a:endParaRPr lang="en-GB" dirty="0"/>
-          </a:p>
-        </p:txBody>
-      </p:sp>
-      <p:sp>
-        <p:nvSpPr>
-          <p:cNvPr id="7" name="Slide Number Placeholder 6">
-            <a:extLst>
-              <a:ext uri="{FF2B5EF4-FFF2-40B4-BE49-F238E27FC236}">
-                <a16:creationId xmlns:a16="http://schemas.microsoft.com/office/drawing/2014/main" id="{F4CED034-607D-8643-9BC8-CF0CDC9B80F3}"/>
+              <a:t>Method – Metrics</a:t>
+            </a:r>
+          </a:p>
+        </p:txBody>
+      </p:sp>
+      <mc:AlternateContent xmlns:mc="http://schemas.openxmlformats.org/markup-compatibility/2006">
+        <mc:Choice xmlns:a14="http://schemas.microsoft.com/office/drawing/2010/main" Requires="a14">
+          <p:sp>
+            <p:nvSpPr>
+              <p:cNvPr id="3" name="Content Placeholder 2">
+                <a:extLst>
+                  <a:ext uri="{FF2B5EF4-FFF2-40B4-BE49-F238E27FC236}">
+                    <a16:creationId xmlns:a16="http://schemas.microsoft.com/office/drawing/2014/main" id="{CAF45B0D-B8E5-E449-A666-D3C6BC5ECD3C}"/>
+                  </a:ext>
+                </a:extLst>
+              </p:cNvPr>
+              <p:cNvSpPr>
+                <a:spLocks noGrp="1"/>
+              </p:cNvSpPr>
+              <p:nvPr>
+                <p:ph sz="half" idx="1"/>
+              </p:nvPr>
+            </p:nvSpPr>
+            <p:spPr/>
+            <p:txBody>
+              <a:bodyPr/>
+              <a:lstStyle/>
+              <a:p>
+                <a:r>
+                  <a:rPr lang="en-GB" dirty="0"/>
+                  <a:t>confidence</a:t>
+                </a:r>
+                <a:br>
+                  <a:rPr lang="en-GB" dirty="0"/>
+                </a:br>
+                <a14:m>
+                  <m:oMath xmlns:m="http://schemas.openxmlformats.org/officeDocument/2006/math">
+                    <m:r>
+                      <a:rPr lang="en-GB" i="1">
+                        <a:latin typeface="Cambria Math" panose="02040503050406030204" pitchFamily="18" charset="0"/>
+                      </a:rPr>
+                      <m:t>𝑐𝑜𝑛𝑓</m:t>
+                    </m:r>
+                    <m:d>
+                      <m:dPr>
+                        <m:ctrlPr>
+                          <a:rPr lang="en-GB" i="1">
+                            <a:latin typeface="Cambria Math" panose="02040503050406030204" pitchFamily="18" charset="0"/>
+                          </a:rPr>
+                        </m:ctrlPr>
+                      </m:dPr>
+                      <m:e>
+                        <m:r>
+                          <a:rPr lang="en-GB" i="1">
+                            <a:latin typeface="Cambria Math" panose="02040503050406030204" pitchFamily="18" charset="0"/>
+                          </a:rPr>
+                          <m:t>𝐴</m:t>
+                        </m:r>
+                        <m:r>
+                          <a:rPr lang="en-GB" i="1">
+                            <a:latin typeface="Cambria Math" panose="02040503050406030204" pitchFamily="18" charset="0"/>
+                          </a:rPr>
+                          <m:t>→</m:t>
+                        </m:r>
+                        <m:r>
+                          <a:rPr lang="en-GB" i="1">
+                            <a:latin typeface="Cambria Math" panose="02040503050406030204" pitchFamily="18" charset="0"/>
+                          </a:rPr>
+                          <m:t>𝐵</m:t>
+                        </m:r>
+                      </m:e>
+                    </m:d>
+                    <m:r>
+                      <a:rPr lang="en-GB" i="1">
+                        <a:latin typeface="Cambria Math" panose="02040503050406030204" pitchFamily="18" charset="0"/>
+                      </a:rPr>
+                      <m:t>= </m:t>
+                    </m:r>
+                    <m:f>
+                      <m:fPr>
+                        <m:ctrlPr>
+                          <a:rPr lang="en-GB" i="1">
+                            <a:latin typeface="Cambria Math" panose="02040503050406030204" pitchFamily="18" charset="0"/>
+                          </a:rPr>
+                        </m:ctrlPr>
+                      </m:fPr>
+                      <m:num>
+                        <m:r>
+                          <a:rPr lang="en-GB" i="1">
+                            <a:latin typeface="Cambria Math" panose="02040503050406030204" pitchFamily="18" charset="0"/>
+                          </a:rPr>
+                          <m:t>𝑑</m:t>
+                        </m:r>
+                        <m:r>
+                          <a:rPr lang="en-GB" i="1">
+                            <a:latin typeface="Cambria Math" panose="02040503050406030204" pitchFamily="18" charset="0"/>
+                          </a:rPr>
+                          <m:t>(</m:t>
+                        </m:r>
+                        <m:r>
+                          <a:rPr lang="en-GB" i="1">
+                            <a:latin typeface="Cambria Math" panose="02040503050406030204" pitchFamily="18" charset="0"/>
+                          </a:rPr>
+                          <m:t>𝐴</m:t>
+                        </m:r>
+                        <m:r>
+                          <a:rPr lang="en-GB" i="1">
+                            <a:latin typeface="Cambria Math" panose="02040503050406030204" pitchFamily="18" charset="0"/>
+                            <a:ea typeface="Cambria Math" panose="02040503050406030204" pitchFamily="18" charset="0"/>
+                          </a:rPr>
+                          <m:t>∪</m:t>
+                        </m:r>
+                        <m:r>
+                          <a:rPr lang="en-GB" i="1">
+                            <a:latin typeface="Cambria Math" panose="02040503050406030204" pitchFamily="18" charset="0"/>
+                          </a:rPr>
+                          <m:t>𝐵</m:t>
+                        </m:r>
+                        <m:r>
+                          <a:rPr lang="en-GB" i="1">
+                            <a:latin typeface="Cambria Math" panose="02040503050406030204" pitchFamily="18" charset="0"/>
+                          </a:rPr>
+                          <m:t>)</m:t>
+                        </m:r>
+                      </m:num>
+                      <m:den>
+                        <m:r>
+                          <a:rPr lang="en-GB" i="1">
+                            <a:latin typeface="Cambria Math" panose="02040503050406030204" pitchFamily="18" charset="0"/>
+                          </a:rPr>
+                          <m:t>𝑑</m:t>
+                        </m:r>
+                        <m:r>
+                          <a:rPr lang="en-GB" i="1">
+                            <a:latin typeface="Cambria Math" panose="02040503050406030204" pitchFamily="18" charset="0"/>
+                          </a:rPr>
+                          <m:t>(</m:t>
+                        </m:r>
+                        <m:r>
+                          <a:rPr lang="en-GB" i="1">
+                            <a:latin typeface="Cambria Math" panose="02040503050406030204" pitchFamily="18" charset="0"/>
+                          </a:rPr>
+                          <m:t>𝐴</m:t>
+                        </m:r>
+                        <m:r>
+                          <a:rPr lang="en-GB" i="1">
+                            <a:latin typeface="Cambria Math" panose="02040503050406030204" pitchFamily="18" charset="0"/>
+                          </a:rPr>
+                          <m:t>)</m:t>
+                        </m:r>
+                      </m:den>
+                    </m:f>
+                  </m:oMath>
+                </a14:m>
+                <a:endParaRPr lang="en-GB" dirty="0"/>
+              </a:p>
+              <a:p>
+                <a:r>
+                  <a:rPr lang="en-GB" dirty="0"/>
+                  <a:t>total number of occurrences</a:t>
+                </a:r>
+              </a:p>
+              <a:p>
+                <a:r>
+                  <a:rPr lang="en-GB" dirty="0"/>
+                  <a:t>duration (sec)</a:t>
+                </a:r>
+              </a:p>
+            </p:txBody>
+          </p:sp>
+        </mc:Choice>
+        <mc:Fallback>
+          <p:sp>
+            <p:nvSpPr>
+              <p:cNvPr id="3" name="Content Placeholder 2">
+                <a:extLst>
+                  <a:ext uri="{FF2B5EF4-FFF2-40B4-BE49-F238E27FC236}">
+                    <a16:creationId xmlns:a16="http://schemas.microsoft.com/office/drawing/2014/main" id="{CAF45B0D-B8E5-E449-A666-D3C6BC5ECD3C}"/>
+                  </a:ext>
+                </a:extLst>
+              </p:cNvPr>
+              <p:cNvSpPr>
+                <a:spLocks noGrp="1" noRot="1" noChangeAspect="1" noMove="1" noResize="1" noEditPoints="1" noAdjustHandles="1" noChangeArrowheads="1" noChangeShapeType="1" noTextEdit="1"/>
+              </p:cNvSpPr>
+              <p:nvPr>
+                <p:ph sz="half" idx="1"/>
+              </p:nvPr>
+            </p:nvSpPr>
+            <p:spPr>
+              <a:blipFill>
+                <a:blip r:embed="rId2"/>
+                <a:stretch>
+                  <a:fillRect l="-1956" t="-2632"/>
+                </a:stretch>
+              </a:blipFill>
+            </p:spPr>
+            <p:txBody>
+              <a:bodyPr/>
+              <a:lstStyle/>
+              <a:p>
+                <a:r>
+                  <a:rPr lang="en-GB">
+                    <a:noFill/>
+                  </a:rPr>
+                  <a:t> </a:t>
+                </a:r>
+              </a:p>
+            </p:txBody>
+          </p:sp>
+        </mc:Fallback>
+      </mc:AlternateContent>
+      <p:sp>
+        <p:nvSpPr>
+          <p:cNvPr id="4" name="Slide Number Placeholder 3">
+            <a:extLst>
+              <a:ext uri="{FF2B5EF4-FFF2-40B4-BE49-F238E27FC236}">
+                <a16:creationId xmlns:a16="http://schemas.microsoft.com/office/drawing/2014/main" id="{C9BCE1B3-80AA-794E-81D6-C6D6A9E5E11F}"/>
               </a:ext>
             </a:extLst>
           </p:cNvPr>
@@ -4443,10 +4989,40 @@
           </a:p>
         </p:txBody>
       </p:sp>
+      <p:pic>
+        <p:nvPicPr>
+          <p:cNvPr id="9" name="Content Placeholder 10">
+            <a:extLst>
+              <a:ext uri="{FF2B5EF4-FFF2-40B4-BE49-F238E27FC236}">
+                <a16:creationId xmlns:a16="http://schemas.microsoft.com/office/drawing/2014/main" id="{5D4B5271-E482-E14B-98E9-D2ED7FE1CCCA}"/>
+              </a:ext>
+            </a:extLst>
+          </p:cNvPr>
+          <p:cNvPicPr>
+            <a:picLocks noChangeAspect="1"/>
+          </p:cNvPicPr>
+          <p:nvPr/>
+        </p:nvPicPr>
+        <p:blipFill>
+          <a:blip r:embed="rId3"/>
+          <a:stretch>
+            <a:fillRect/>
+          </a:stretch>
+        </p:blipFill>
+        <p:spPr>
+          <a:xfrm>
+            <a:off x="6172200" y="2453581"/>
+            <a:ext cx="5181600" cy="2076521"/>
+          </a:xfrm>
+          <a:prstGeom prst="rect">
+            <a:avLst/>
+          </a:prstGeom>
+        </p:spPr>
+      </p:pic>
     </p:spTree>
     <p:extLst>
       <p:ext uri="{BB962C8B-B14F-4D97-AF65-F5344CB8AC3E}">
-        <p14:creationId xmlns:p14="http://schemas.microsoft.com/office/powerpoint/2010/main" val="3790449628"/>
+        <p14:creationId xmlns:p14="http://schemas.microsoft.com/office/powerpoint/2010/main" val="1864738302"/>
       </p:ext>
     </p:extLst>
   </p:cSld>
@@ -4496,46 +5072,141 @@
           <a:p>
             <a:r>
               <a:rPr lang="en-GB" dirty="0"/>
-              <a:t>Significance</a:t>
-            </a:r>
-          </a:p>
-        </p:txBody>
-      </p:sp>
-      <p:pic>
-        <p:nvPicPr>
-          <p:cNvPr id="5" name="Content Placeholder 4">
-            <a:extLst>
-              <a:ext uri="{FF2B5EF4-FFF2-40B4-BE49-F238E27FC236}">
-                <a16:creationId xmlns:a16="http://schemas.microsoft.com/office/drawing/2014/main" id="{379E4102-746E-584D-823C-7824098F232B}"/>
-              </a:ext>
-            </a:extLst>
-          </p:cNvPr>
-          <p:cNvPicPr>
-            <a:picLocks noGrp="1" noChangeAspect="1"/>
-          </p:cNvPicPr>
-          <p:nvPr>
-            <p:ph idx="1"/>
-          </p:nvPr>
-        </p:nvPicPr>
-        <p:blipFill>
-          <a:blip r:embed="rId2"/>
-          <a:stretch>
-            <a:fillRect/>
-          </a:stretch>
-        </p:blipFill>
-        <p:spPr>
-          <a:xfrm>
-            <a:off x="3507385" y="1825625"/>
-            <a:ext cx="5177229" cy="4351338"/>
-          </a:xfrm>
-        </p:spPr>
-      </p:pic>
+              <a:t>Significance – Why?</a:t>
+            </a:r>
+          </a:p>
+        </p:txBody>
+      </p:sp>
+      <p:sp>
+        <p:nvSpPr>
+          <p:cNvPr id="6" name="Text Placeholder 5">
+            <a:extLst>
+              <a:ext uri="{FF2B5EF4-FFF2-40B4-BE49-F238E27FC236}">
+                <a16:creationId xmlns:a16="http://schemas.microsoft.com/office/drawing/2014/main" id="{42853BAA-A6F8-7B48-A35F-D3289F5EC34C}"/>
+              </a:ext>
+            </a:extLst>
+          </p:cNvPr>
+          <p:cNvSpPr>
+            <a:spLocks noGrp="1"/>
+          </p:cNvSpPr>
+          <p:nvPr>
+            <p:ph type="body" idx="1"/>
+          </p:nvPr>
+        </p:nvSpPr>
+        <p:spPr/>
+        <p:txBody>
+          <a:bodyPr/>
+          <a:lstStyle/>
+          <a:p>
+            <a:r>
+              <a:rPr lang="en-GB" dirty="0"/>
+              <a:t>Before</a:t>
+            </a:r>
+          </a:p>
+        </p:txBody>
+      </p:sp>
+      <p:sp>
+        <p:nvSpPr>
+          <p:cNvPr id="8" name="Content Placeholder 7">
+            <a:extLst>
+              <a:ext uri="{FF2B5EF4-FFF2-40B4-BE49-F238E27FC236}">
+                <a16:creationId xmlns:a16="http://schemas.microsoft.com/office/drawing/2014/main" id="{BC929C0D-0248-FA46-AC54-F02829515133}"/>
+              </a:ext>
+            </a:extLst>
+          </p:cNvPr>
+          <p:cNvSpPr>
+            <a:spLocks noGrp="1"/>
+          </p:cNvSpPr>
+          <p:nvPr>
+            <p:ph sz="half" idx="2"/>
+          </p:nvPr>
+        </p:nvSpPr>
+        <p:spPr/>
+        <p:txBody>
+          <a:bodyPr/>
+          <a:lstStyle/>
+          <a:p>
+            <a:r>
+              <a:rPr lang="en-GB" dirty="0"/>
+              <a:t>”Why did you choose this rule?”</a:t>
+            </a:r>
+          </a:p>
+          <a:p>
+            <a:r>
+              <a:rPr lang="en-GB" dirty="0"/>
+              <a:t>“Because it looked interesting to me.”</a:t>
+            </a:r>
+          </a:p>
+        </p:txBody>
+      </p:sp>
+      <p:sp>
+        <p:nvSpPr>
+          <p:cNvPr id="9" name="Text Placeholder 8">
+            <a:extLst>
+              <a:ext uri="{FF2B5EF4-FFF2-40B4-BE49-F238E27FC236}">
+                <a16:creationId xmlns:a16="http://schemas.microsoft.com/office/drawing/2014/main" id="{A88A56D2-136E-3E4D-806A-4E761FD4AAD0}"/>
+              </a:ext>
+            </a:extLst>
+          </p:cNvPr>
+          <p:cNvSpPr>
+            <a:spLocks noGrp="1"/>
+          </p:cNvSpPr>
+          <p:nvPr>
+            <p:ph type="body" sz="quarter" idx="3"/>
+          </p:nvPr>
+        </p:nvSpPr>
+        <p:spPr/>
+        <p:txBody>
+          <a:bodyPr/>
+          <a:lstStyle/>
+          <a:p>
+            <a:r>
+              <a:rPr lang="en-GB" dirty="0"/>
+              <a:t>After</a:t>
+            </a:r>
+          </a:p>
+        </p:txBody>
+      </p:sp>
+      <p:sp>
+        <p:nvSpPr>
+          <p:cNvPr id="10" name="Content Placeholder 9">
+            <a:extLst>
+              <a:ext uri="{FF2B5EF4-FFF2-40B4-BE49-F238E27FC236}">
+                <a16:creationId xmlns:a16="http://schemas.microsoft.com/office/drawing/2014/main" id="{A84D8383-726A-3842-B110-0DEEAAB7FCD9}"/>
+              </a:ext>
+            </a:extLst>
+          </p:cNvPr>
+          <p:cNvSpPr>
+            <a:spLocks noGrp="1"/>
+          </p:cNvSpPr>
+          <p:nvPr>
+            <p:ph sz="quarter" idx="4"/>
+          </p:nvPr>
+        </p:nvSpPr>
+        <p:spPr/>
+        <p:txBody>
+          <a:bodyPr/>
+          <a:lstStyle/>
+          <a:p>
+            <a:r>
+              <a:rPr lang="en-GB" dirty="0"/>
+              <a:t>”Why did you choose this rule?”</a:t>
+            </a:r>
+          </a:p>
+          <a:p>
+            <a:r>
+              <a:rPr lang="en-GB" dirty="0"/>
+              <a:t>“Because it looked interesting to me. Also, the numbers support this claim.”</a:t>
+            </a:r>
+          </a:p>
+        </p:txBody>
+      </p:sp>
       <p:sp>
         <p:nvSpPr>
           <p:cNvPr id="7" name="Slide Number Placeholder 6">
             <a:extLst>
               <a:ext uri="{FF2B5EF4-FFF2-40B4-BE49-F238E27FC236}">
-                <a16:creationId xmlns:a16="http://schemas.microsoft.com/office/drawing/2014/main" id="{B5675632-BC3D-B242-B826-B5C5DB5315C6}"/>
+                <a16:creationId xmlns:a16="http://schemas.microsoft.com/office/drawing/2014/main" id="{F4CED034-607D-8643-9BC8-CF0CDC9B80F3}"/>
               </a:ext>
             </a:extLst>
           </p:cNvPr>
@@ -4562,7 +5233,7 @@
     </p:spTree>
     <p:extLst>
       <p:ext uri="{BB962C8B-B14F-4D97-AF65-F5344CB8AC3E}">
-        <p14:creationId xmlns:p14="http://schemas.microsoft.com/office/powerpoint/2010/main" val="886777277"/>
+        <p14:creationId xmlns:p14="http://schemas.microsoft.com/office/powerpoint/2010/main" val="3790449628"/>
       </p:ext>
     </p:extLst>
   </p:cSld>
@@ -4612,57 +5283,45 @@
           <a:p>
             <a:r>
               <a:rPr lang="en-GB" dirty="0"/>
-              <a:t>Method</a:t>
-            </a:r>
-          </a:p>
-        </p:txBody>
-      </p:sp>
-      <p:sp>
-        <p:nvSpPr>
-          <p:cNvPr id="3" name="Content Placeholder 2">
-            <a:extLst>
-              <a:ext uri="{FF2B5EF4-FFF2-40B4-BE49-F238E27FC236}">
-                <a16:creationId xmlns:a16="http://schemas.microsoft.com/office/drawing/2014/main" id="{CAF45B0D-B8E5-E449-A666-D3C6BC5ECD3C}"/>
-              </a:ext>
-            </a:extLst>
-          </p:cNvPr>
-          <p:cNvSpPr>
-            <a:spLocks noGrp="1"/>
-          </p:cNvSpPr>
+              <a:t>Significance – How?</a:t>
+            </a:r>
+          </a:p>
+        </p:txBody>
+      </p:sp>
+      <p:pic>
+        <p:nvPicPr>
+          <p:cNvPr id="5" name="Content Placeholder 4">
+            <a:extLst>
+              <a:ext uri="{FF2B5EF4-FFF2-40B4-BE49-F238E27FC236}">
+                <a16:creationId xmlns:a16="http://schemas.microsoft.com/office/drawing/2014/main" id="{379E4102-746E-584D-823C-7824098F232B}"/>
+              </a:ext>
+            </a:extLst>
+          </p:cNvPr>
+          <p:cNvPicPr>
+            <a:picLocks noGrp="1" noChangeAspect="1"/>
+          </p:cNvPicPr>
           <p:nvPr>
             <p:ph idx="1"/>
           </p:nvPr>
-        </p:nvSpPr>
-        <p:spPr/>
-        <p:txBody>
-          <a:bodyPr/>
-          <a:lstStyle/>
-          <a:p>
-            <a:r>
-              <a:rPr lang="en-GB" dirty="0"/>
-              <a:t>explain model for null-distributions</a:t>
-            </a:r>
-          </a:p>
-          <a:p>
-            <a:r>
-              <a:rPr lang="en-GB" dirty="0"/>
-              <a:t>What was randomised, what was not? Why?</a:t>
-            </a:r>
-          </a:p>
-          <a:p>
-            <a:r>
-              <a:rPr lang="en-GB" dirty="0"/>
-              <a:t>recall 3 metrics: explain their weighting</a:t>
-            </a:r>
-          </a:p>
-        </p:txBody>
-      </p:sp>
-      <p:sp>
-        <p:nvSpPr>
-          <p:cNvPr id="4" name="Slide Number Placeholder 3">
-            <a:extLst>
-              <a:ext uri="{FF2B5EF4-FFF2-40B4-BE49-F238E27FC236}">
-                <a16:creationId xmlns:a16="http://schemas.microsoft.com/office/drawing/2014/main" id="{5E471C80-F3F9-9446-9D10-446D1A1ADC1A}"/>
+        </p:nvPicPr>
+        <p:blipFill rotWithShape="1">
+          <a:blip r:embed="rId3"/>
+          <a:srcRect t="3676" b="4762"/>
+          <a:stretch/>
+        </p:blipFill>
+        <p:spPr>
+          <a:xfrm>
+            <a:off x="2651760" y="1327102"/>
+            <a:ext cx="6888480" cy="5301076"/>
+          </a:xfrm>
+        </p:spPr>
+      </p:pic>
+      <p:sp>
+        <p:nvSpPr>
+          <p:cNvPr id="7" name="Slide Number Placeholder 6">
+            <a:extLst>
+              <a:ext uri="{FF2B5EF4-FFF2-40B4-BE49-F238E27FC236}">
+                <a16:creationId xmlns:a16="http://schemas.microsoft.com/office/drawing/2014/main" id="{B5675632-BC3D-B242-B826-B5C5DB5315C6}"/>
               </a:ext>
             </a:extLst>
           </p:cNvPr>
@@ -4689,7 +5348,7 @@
     </p:spTree>
     <p:extLst>
       <p:ext uri="{BB962C8B-B14F-4D97-AF65-F5344CB8AC3E}">
-        <p14:creationId xmlns:p14="http://schemas.microsoft.com/office/powerpoint/2010/main" val="3742017334"/>
+        <p14:creationId xmlns:p14="http://schemas.microsoft.com/office/powerpoint/2010/main" val="886777277"/>
       </p:ext>
     </p:extLst>
   </p:cSld>
@@ -4739,66 +5398,46 @@
           <a:p>
             <a:r>
               <a:rPr lang="en-GB" dirty="0"/>
-              <a:t>Results (if we have them)</a:t>
-            </a:r>
-          </a:p>
-        </p:txBody>
-      </p:sp>
-      <p:sp>
-        <p:nvSpPr>
-          <p:cNvPr id="3" name="Content Placeholder 2">
-            <a:extLst>
-              <a:ext uri="{FF2B5EF4-FFF2-40B4-BE49-F238E27FC236}">
-                <a16:creationId xmlns:a16="http://schemas.microsoft.com/office/drawing/2014/main" id="{CAF45B0D-B8E5-E449-A666-D3C6BC5ECD3C}"/>
-              </a:ext>
-            </a:extLst>
-          </p:cNvPr>
-          <p:cNvSpPr>
-            <a:spLocks noGrp="1"/>
-          </p:cNvSpPr>
+              <a:t>Significance – How?</a:t>
+            </a:r>
+          </a:p>
+        </p:txBody>
+      </p:sp>
+      <p:pic>
+        <p:nvPicPr>
+          <p:cNvPr id="6" name="Content Placeholder 5">
+            <a:extLst>
+              <a:ext uri="{FF2B5EF4-FFF2-40B4-BE49-F238E27FC236}">
+                <a16:creationId xmlns:a16="http://schemas.microsoft.com/office/drawing/2014/main" id="{AE4791D1-0D6D-274A-9969-838EFB02EBDF}"/>
+              </a:ext>
+            </a:extLst>
+          </p:cNvPr>
+          <p:cNvPicPr>
+            <a:picLocks noGrp="1" noChangeAspect="1"/>
+          </p:cNvPicPr>
           <p:nvPr>
             <p:ph idx="1"/>
           </p:nvPr>
-        </p:nvSpPr>
-        <p:spPr/>
-        <p:txBody>
-          <a:bodyPr/>
-          <a:lstStyle/>
-          <a:p>
-            <a:r>
-              <a:rPr lang="en-GB" dirty="0"/>
-              <a:t>numerical vs applied significance</a:t>
-            </a:r>
-          </a:p>
-          <a:p>
-            <a:endParaRPr lang="en-GB" dirty="0"/>
-          </a:p>
-          <a:p>
-            <a:r>
-              <a:rPr lang="en-GB" dirty="0"/>
-              <a:t>rules confirming existing research</a:t>
-            </a:r>
-          </a:p>
-          <a:p>
-            <a:r>
-              <a:rPr lang="en-GB" dirty="0"/>
-              <a:t>new ”interesting” rules (whatever that means)</a:t>
-            </a:r>
-          </a:p>
-          <a:p>
-            <a:r>
-              <a:rPr lang="en-GB" dirty="0"/>
-              <a:t>possible hypotheses generated from new rules</a:t>
-            </a:r>
-          </a:p>
-        </p:txBody>
-      </p:sp>
+        </p:nvPicPr>
+        <p:blipFill>
+          <a:blip r:embed="rId2"/>
+          <a:stretch>
+            <a:fillRect/>
+          </a:stretch>
+        </p:blipFill>
+        <p:spPr>
+          <a:xfrm>
+            <a:off x="2396464" y="1825625"/>
+            <a:ext cx="7399072" cy="4351338"/>
+          </a:xfrm>
+        </p:spPr>
+      </p:pic>
       <p:sp>
         <p:nvSpPr>
           <p:cNvPr id="4" name="Slide Number Placeholder 3">
             <a:extLst>
               <a:ext uri="{FF2B5EF4-FFF2-40B4-BE49-F238E27FC236}">
-                <a16:creationId xmlns:a16="http://schemas.microsoft.com/office/drawing/2014/main" id="{92C00CBE-9A88-CC4A-9788-916F84EDDFCB}"/>
+                <a16:creationId xmlns:a16="http://schemas.microsoft.com/office/drawing/2014/main" id="{5E471C80-F3F9-9446-9D10-446D1A1ADC1A}"/>
               </a:ext>
             </a:extLst>
           </p:cNvPr>
@@ -4825,7 +5464,7 @@
     </p:spTree>
     <p:extLst>
       <p:ext uri="{BB962C8B-B14F-4D97-AF65-F5344CB8AC3E}">
-        <p14:creationId xmlns:p14="http://schemas.microsoft.com/office/powerpoint/2010/main" val="3418532346"/>
+        <p14:creationId xmlns:p14="http://schemas.microsoft.com/office/powerpoint/2010/main" val="3742017334"/>
       </p:ext>
     </p:extLst>
   </p:cSld>

</xml_diff>

<commit_message>
beamer done, imgs removed from git
</commit_message>
<xml_diff>
--- a/tex/beamer_dummy.pptx
+++ b/tex/beamer_dummy.pptx
@@ -5,7 +5,7 @@
     <p:sldMasterId id="2147483648" r:id="rId1"/>
   </p:sldMasterIdLst>
   <p:notesMasterIdLst>
-    <p:notesMasterId r:id="rId14"/>
+    <p:notesMasterId r:id="rId16"/>
   </p:notesMasterIdLst>
   <p:sldIdLst>
     <p:sldId id="256" r:id="rId2"/>
@@ -14,12 +14,14 @@
     <p:sldId id="270" r:id="rId5"/>
     <p:sldId id="261" r:id="rId6"/>
     <p:sldId id="258" r:id="rId7"/>
-    <p:sldId id="265" r:id="rId8"/>
-    <p:sldId id="266" r:id="rId9"/>
-    <p:sldId id="269" r:id="rId10"/>
-    <p:sldId id="262" r:id="rId11"/>
-    <p:sldId id="263" r:id="rId12"/>
-    <p:sldId id="271" r:id="rId13"/>
+    <p:sldId id="273" r:id="rId8"/>
+    <p:sldId id="265" r:id="rId9"/>
+    <p:sldId id="266" r:id="rId10"/>
+    <p:sldId id="269" r:id="rId11"/>
+    <p:sldId id="262" r:id="rId12"/>
+    <p:sldId id="274" r:id="rId13"/>
+    <p:sldId id="263" r:id="rId14"/>
+    <p:sldId id="272" r:id="rId15"/>
   </p:sldIdLst>
   <p:sldSz cx="12192000" cy="6858000"/>
   <p:notesSz cx="6858000" cy="9144000"/>
@@ -137,6 +139,7 @@
           <p14:sldIdLst>
             <p14:sldId id="261"/>
             <p14:sldId id="258"/>
+            <p14:sldId id="273"/>
             <p14:sldId id="265"/>
             <p14:sldId id="266"/>
           </p14:sldIdLst>
@@ -145,12 +148,13 @@
           <p14:sldIdLst>
             <p14:sldId id="269"/>
             <p14:sldId id="262"/>
+            <p14:sldId id="274"/>
           </p14:sldIdLst>
         </p14:section>
         <p14:section name="Interpretation" id="{1BEEDD45-8FF3-5D4E-A02E-D27E6B7E8DC0}">
           <p14:sldIdLst>
             <p14:sldId id="263"/>
-            <p14:sldId id="271"/>
+            <p14:sldId id="272"/>
           </p14:sldIdLst>
         </p14:section>
       </p14:sectionLst>
@@ -558,7 +562,597 @@
           <a:p>
             <a:r>
               <a:rPr lang="en-GB" dirty="0"/>
-              <a:t>add reference</a:t>
+              <a:t>some models assume language and gesture to originate in the same system</a:t>
+            </a:r>
+          </a:p>
+          <a:p>
+            <a:endParaRPr lang="en-GB" dirty="0"/>
+          </a:p>
+        </p:txBody>
+      </p:sp>
+      <p:sp>
+        <p:nvSpPr>
+          <p:cNvPr id="4" name="Slide Number Placeholder 3"/>
+          <p:cNvSpPr>
+            <a:spLocks noGrp="1"/>
+          </p:cNvSpPr>
+          <p:nvPr>
+            <p:ph type="sldNum" sz="quarter" idx="10"/>
+          </p:nvPr>
+        </p:nvSpPr>
+        <p:spPr/>
+        <p:txBody>
+          <a:bodyPr/>
+          <a:lstStyle/>
+          <a:p>
+            <a:fld id="{2A6D38AD-DC69-7A49-A3BA-49389EBC1442}" type="slidenum">
+              <a:rPr lang="en-GB" smtClean="0"/>
+              <a:t>3</a:t>
+            </a:fld>
+            <a:endParaRPr lang="en-GB"/>
+          </a:p>
+        </p:txBody>
+      </p:sp>
+    </p:spTree>
+    <p:extLst>
+      <p:ext uri="{BB962C8B-B14F-4D97-AF65-F5344CB8AC3E}">
+        <p14:creationId xmlns:p14="http://schemas.microsoft.com/office/powerpoint/2010/main" val="950014766"/>
+      </p:ext>
+    </p:extLst>
+  </p:cSld>
+  <p:clrMapOvr>
+    <a:masterClrMapping/>
+  </p:clrMapOvr>
+</p:notes>
+</file>
+
+<file path=ppt/notesSlides/notesSlide10.xml><?xml version="1.0" encoding="utf-8"?>
+<p:notes xmlns:a="http://schemas.openxmlformats.org/drawingml/2006/main" xmlns:r="http://schemas.openxmlformats.org/officeDocument/2006/relationships" xmlns:p="http://schemas.openxmlformats.org/presentationml/2006/main">
+  <p:cSld>
+    <p:spTree>
+      <p:nvGrpSpPr>
+        <p:cNvPr id="1" name=""/>
+        <p:cNvGrpSpPr/>
+        <p:nvPr/>
+      </p:nvGrpSpPr>
+      <p:grpSpPr>
+        <a:xfrm>
+          <a:off x="0" y="0"/>
+          <a:ext cx="0" cy="0"/>
+          <a:chOff x="0" y="0"/>
+          <a:chExt cx="0" cy="0"/>
+        </a:xfrm>
+      </p:grpSpPr>
+      <p:sp>
+        <p:nvSpPr>
+          <p:cNvPr id="2" name="Slide Image Placeholder 1"/>
+          <p:cNvSpPr>
+            <a:spLocks noGrp="1" noRot="1" noChangeAspect="1"/>
+          </p:cNvSpPr>
+          <p:nvPr>
+            <p:ph type="sldImg"/>
+          </p:nvPr>
+        </p:nvSpPr>
+        <p:spPr/>
+      </p:sp>
+      <p:sp>
+        <p:nvSpPr>
+          <p:cNvPr id="3" name="Notes Placeholder 2"/>
+          <p:cNvSpPr>
+            <a:spLocks noGrp="1"/>
+          </p:cNvSpPr>
+          <p:nvPr>
+            <p:ph type="body" idx="1"/>
+          </p:nvPr>
+        </p:nvSpPr>
+        <p:spPr/>
+        <p:txBody>
+          <a:bodyPr/>
+          <a:lstStyle/>
+          <a:p>
+            <a:pPr marL="171450" indent="-171450">
+              <a:buFontTx/>
+              <a:buChar char="-"/>
+            </a:pPr>
+            <a:r>
+              <a:rPr lang="en-GB" dirty="0"/>
+              <a:t>all 3 metrics</a:t>
+            </a:r>
+          </a:p>
+          <a:p>
+            <a:pPr marL="171450" indent="-171450">
+              <a:buFontTx/>
+              <a:buChar char="-"/>
+            </a:pPr>
+            <a:r>
+              <a:rPr lang="en-GB" dirty="0"/>
+              <a:t>mothers always talk</a:t>
+            </a:r>
+          </a:p>
+        </p:txBody>
+      </p:sp>
+      <p:sp>
+        <p:nvSpPr>
+          <p:cNvPr id="4" name="Slide Number Placeholder 3"/>
+          <p:cNvSpPr>
+            <a:spLocks noGrp="1"/>
+          </p:cNvSpPr>
+          <p:nvPr>
+            <p:ph type="sldNum" sz="quarter" idx="10"/>
+          </p:nvPr>
+        </p:nvSpPr>
+        <p:spPr/>
+        <p:txBody>
+          <a:bodyPr/>
+          <a:lstStyle/>
+          <a:p>
+            <a:fld id="{2A6D38AD-DC69-7A49-A3BA-49389EBC1442}" type="slidenum">
+              <a:rPr lang="en-GB" smtClean="0"/>
+              <a:t>13</a:t>
+            </a:fld>
+            <a:endParaRPr lang="en-GB"/>
+          </a:p>
+        </p:txBody>
+      </p:sp>
+    </p:spTree>
+    <p:extLst>
+      <p:ext uri="{BB962C8B-B14F-4D97-AF65-F5344CB8AC3E}">
+        <p14:creationId xmlns:p14="http://schemas.microsoft.com/office/powerpoint/2010/main" val="2798097780"/>
+      </p:ext>
+    </p:extLst>
+  </p:cSld>
+  <p:clrMapOvr>
+    <a:masterClrMapping/>
+  </p:clrMapOvr>
+</p:notes>
+</file>
+
+<file path=ppt/notesSlides/notesSlide11.xml><?xml version="1.0" encoding="utf-8"?>
+<p:notes xmlns:a="http://schemas.openxmlformats.org/drawingml/2006/main" xmlns:r="http://schemas.openxmlformats.org/officeDocument/2006/relationships" xmlns:p="http://schemas.openxmlformats.org/presentationml/2006/main">
+  <p:cSld>
+    <p:spTree>
+      <p:nvGrpSpPr>
+        <p:cNvPr id="1" name=""/>
+        <p:cNvGrpSpPr/>
+        <p:nvPr/>
+      </p:nvGrpSpPr>
+      <p:grpSpPr>
+        <a:xfrm>
+          <a:off x="0" y="0"/>
+          <a:ext cx="0" cy="0"/>
+          <a:chOff x="0" y="0"/>
+          <a:chExt cx="0" cy="0"/>
+        </a:xfrm>
+      </p:grpSpPr>
+      <p:sp>
+        <p:nvSpPr>
+          <p:cNvPr id="2" name="Slide Image Placeholder 1"/>
+          <p:cNvSpPr>
+            <a:spLocks noGrp="1" noRot="1" noChangeAspect="1"/>
+          </p:cNvSpPr>
+          <p:nvPr>
+            <p:ph type="sldImg"/>
+          </p:nvPr>
+        </p:nvSpPr>
+        <p:spPr/>
+      </p:sp>
+      <p:sp>
+        <p:nvSpPr>
+          <p:cNvPr id="3" name="Notes Placeholder 2"/>
+          <p:cNvSpPr>
+            <a:spLocks noGrp="1"/>
+          </p:cNvSpPr>
+          <p:nvPr>
+            <p:ph type="body" idx="1"/>
+          </p:nvPr>
+        </p:nvSpPr>
+        <p:spPr/>
+        <p:txBody>
+          <a:bodyPr/>
+          <a:lstStyle/>
+          <a:p>
+            <a:pPr marL="171450" indent="-171450">
+              <a:buFontTx/>
+              <a:buChar char="-"/>
+            </a:pPr>
+            <a:r>
+              <a:rPr lang="en-GB" dirty="0"/>
+              <a:t>confirming existing research</a:t>
+            </a:r>
+          </a:p>
+          <a:p>
+            <a:pPr marL="171450" indent="-171450">
+              <a:buFontTx/>
+              <a:buChar char="-"/>
+            </a:pPr>
+            <a:r>
+              <a:rPr lang="en-GB" dirty="0"/>
+              <a:t>new interesting rules</a:t>
+            </a:r>
+          </a:p>
+          <a:p>
+            <a:pPr marL="171450" indent="-171450">
+              <a:buFontTx/>
+              <a:buChar char="-"/>
+            </a:pPr>
+            <a:endParaRPr lang="en-GB" dirty="0"/>
+          </a:p>
+        </p:txBody>
+      </p:sp>
+      <p:sp>
+        <p:nvSpPr>
+          <p:cNvPr id="4" name="Slide Number Placeholder 3"/>
+          <p:cNvSpPr>
+            <a:spLocks noGrp="1"/>
+          </p:cNvSpPr>
+          <p:nvPr>
+            <p:ph type="sldNum" sz="quarter" idx="10"/>
+          </p:nvPr>
+        </p:nvSpPr>
+        <p:spPr/>
+        <p:txBody>
+          <a:bodyPr/>
+          <a:lstStyle/>
+          <a:p>
+            <a:fld id="{2A6D38AD-DC69-7A49-A3BA-49389EBC1442}" type="slidenum">
+              <a:rPr lang="en-GB" smtClean="0"/>
+              <a:t>14</a:t>
+            </a:fld>
+            <a:endParaRPr lang="en-GB"/>
+          </a:p>
+        </p:txBody>
+      </p:sp>
+    </p:spTree>
+    <p:extLst>
+      <p:ext uri="{BB962C8B-B14F-4D97-AF65-F5344CB8AC3E}">
+        <p14:creationId xmlns:p14="http://schemas.microsoft.com/office/powerpoint/2010/main" val="1935764126"/>
+      </p:ext>
+    </p:extLst>
+  </p:cSld>
+  <p:clrMapOvr>
+    <a:masterClrMapping/>
+  </p:clrMapOvr>
+</p:notes>
+</file>
+
+<file path=ppt/notesSlides/notesSlide2.xml><?xml version="1.0" encoding="utf-8"?>
+<p:notes xmlns:a="http://schemas.openxmlformats.org/drawingml/2006/main" xmlns:r="http://schemas.openxmlformats.org/officeDocument/2006/relationships" xmlns:p="http://schemas.openxmlformats.org/presentationml/2006/main">
+  <p:cSld>
+    <p:spTree>
+      <p:nvGrpSpPr>
+        <p:cNvPr id="1" name=""/>
+        <p:cNvGrpSpPr/>
+        <p:nvPr/>
+      </p:nvGrpSpPr>
+      <p:grpSpPr>
+        <a:xfrm>
+          <a:off x="0" y="0"/>
+          <a:ext cx="0" cy="0"/>
+          <a:chOff x="0" y="0"/>
+          <a:chExt cx="0" cy="0"/>
+        </a:xfrm>
+      </p:grpSpPr>
+      <p:sp>
+        <p:nvSpPr>
+          <p:cNvPr id="2" name="Slide Image Placeholder 1"/>
+          <p:cNvSpPr>
+            <a:spLocks noGrp="1" noRot="1" noChangeAspect="1"/>
+          </p:cNvSpPr>
+          <p:nvPr>
+            <p:ph type="sldImg"/>
+          </p:nvPr>
+        </p:nvSpPr>
+        <p:spPr/>
+      </p:sp>
+      <p:sp>
+        <p:nvSpPr>
+          <p:cNvPr id="3" name="Notes Placeholder 2"/>
+          <p:cNvSpPr>
+            <a:spLocks noGrp="1"/>
+          </p:cNvSpPr>
+          <p:nvPr>
+            <p:ph type="body" idx="1"/>
+          </p:nvPr>
+        </p:nvSpPr>
+        <p:spPr/>
+        <p:txBody>
+          <a:bodyPr/>
+          <a:lstStyle/>
+          <a:p>
+            <a:r>
+              <a:rPr lang="en-GB" dirty="0"/>
+              <a:t>Why diaper routine?</a:t>
+            </a:r>
+          </a:p>
+          <a:p>
+            <a:pPr marL="171450" indent="-171450">
+              <a:buFontTx/>
+              <a:buChar char="-"/>
+            </a:pPr>
+            <a:r>
+              <a:rPr lang="en-GB" dirty="0"/>
+              <a:t>activity known to mother and infant</a:t>
+            </a:r>
+          </a:p>
+          <a:p>
+            <a:pPr marL="171450" indent="-171450">
+              <a:buFontTx/>
+              <a:buChar char="-"/>
+            </a:pPr>
+            <a:r>
+              <a:rPr lang="en-GB" dirty="0"/>
+              <a:t>interaction over a relatively long period of time without change of location etc</a:t>
+            </a:r>
+          </a:p>
+          <a:p>
+            <a:endParaRPr lang="en-GB" dirty="0"/>
+          </a:p>
+          <a:p>
+            <a:r>
+              <a:rPr lang="en-GB" dirty="0"/>
+              <a:t>data recorded in family’s home, only introduced changing table (change unit)</a:t>
+            </a:r>
+          </a:p>
+          <a:p>
+            <a:endParaRPr lang="en-GB" dirty="0"/>
+          </a:p>
+          <a:p>
+            <a:pPr marL="0" marR="0" lvl="0" indent="0" algn="l" defTabSz="914400" rtl="0" eaLnBrk="1" fontAlgn="auto" latinLnBrk="0" hangingPunct="1">
+              <a:lnSpc>
+                <a:spcPct val="100000"/>
+              </a:lnSpc>
+              <a:spcBef>
+                <a:spcPts val="0"/>
+              </a:spcBef>
+              <a:spcAft>
+                <a:spcPts val="0"/>
+              </a:spcAft>
+              <a:buClrTx/>
+              <a:buSzTx/>
+              <a:buFontTx/>
+              <a:buNone/>
+              <a:tabLst/>
+              <a:defRPr/>
+            </a:pPr>
+            <a:r>
+              <a:rPr lang="en-GB" dirty="0"/>
+              <a:t>NEXT: 15sec example video</a:t>
+            </a:r>
+          </a:p>
+          <a:p>
+            <a:pPr marL="0" marR="0" lvl="0" indent="0" algn="l" defTabSz="914400" rtl="0" eaLnBrk="1" fontAlgn="auto" latinLnBrk="0" hangingPunct="1">
+              <a:lnSpc>
+                <a:spcPct val="100000"/>
+              </a:lnSpc>
+              <a:spcBef>
+                <a:spcPts val="0"/>
+              </a:spcBef>
+              <a:spcAft>
+                <a:spcPts val="0"/>
+              </a:spcAft>
+              <a:buClrTx/>
+              <a:buSzTx/>
+              <a:buFontTx/>
+              <a:buNone/>
+              <a:tabLst/>
+              <a:defRPr/>
+            </a:pPr>
+            <a:r>
+              <a:rPr lang="en-GB" dirty="0"/>
+              <a:t>Tell people what to pay attention to!</a:t>
+            </a:r>
+          </a:p>
+        </p:txBody>
+      </p:sp>
+      <p:sp>
+        <p:nvSpPr>
+          <p:cNvPr id="4" name="Slide Number Placeholder 3"/>
+          <p:cNvSpPr>
+            <a:spLocks noGrp="1"/>
+          </p:cNvSpPr>
+          <p:nvPr>
+            <p:ph type="sldNum" sz="quarter" idx="10"/>
+          </p:nvPr>
+        </p:nvSpPr>
+        <p:spPr/>
+        <p:txBody>
+          <a:bodyPr/>
+          <a:lstStyle/>
+          <a:p>
+            <a:fld id="{2A6D38AD-DC69-7A49-A3BA-49389EBC1442}" type="slidenum">
+              <a:rPr lang="en-GB" smtClean="0"/>
+              <a:t>5</a:t>
+            </a:fld>
+            <a:endParaRPr lang="en-GB"/>
+          </a:p>
+        </p:txBody>
+      </p:sp>
+    </p:spTree>
+    <p:extLst>
+      <p:ext uri="{BB962C8B-B14F-4D97-AF65-F5344CB8AC3E}">
+        <p14:creationId xmlns:p14="http://schemas.microsoft.com/office/powerpoint/2010/main" val="54914635"/>
+      </p:ext>
+    </p:extLst>
+  </p:cSld>
+  <p:clrMapOvr>
+    <a:masterClrMapping/>
+  </p:clrMapOvr>
+</p:notes>
+</file>
+
+<file path=ppt/notesSlides/notesSlide3.xml><?xml version="1.0" encoding="utf-8"?>
+<p:notes xmlns:a="http://schemas.openxmlformats.org/drawingml/2006/main" xmlns:r="http://schemas.openxmlformats.org/officeDocument/2006/relationships" xmlns:p="http://schemas.openxmlformats.org/presentationml/2006/main">
+  <p:cSld>
+    <p:spTree>
+      <p:nvGrpSpPr>
+        <p:cNvPr id="1" name=""/>
+        <p:cNvGrpSpPr/>
+        <p:nvPr/>
+      </p:nvGrpSpPr>
+      <p:grpSpPr>
+        <a:xfrm>
+          <a:off x="0" y="0"/>
+          <a:ext cx="0" cy="0"/>
+          <a:chOff x="0" y="0"/>
+          <a:chExt cx="0" cy="0"/>
+        </a:xfrm>
+      </p:grpSpPr>
+      <p:sp>
+        <p:nvSpPr>
+          <p:cNvPr id="2" name="Slide Image Placeholder 1"/>
+          <p:cNvSpPr>
+            <a:spLocks noGrp="1" noRot="1" noChangeAspect="1"/>
+          </p:cNvSpPr>
+          <p:nvPr>
+            <p:ph type="sldImg"/>
+          </p:nvPr>
+        </p:nvSpPr>
+        <p:spPr/>
+      </p:sp>
+      <p:sp>
+        <p:nvSpPr>
+          <p:cNvPr id="3" name="Notes Placeholder 2"/>
+          <p:cNvSpPr>
+            <a:spLocks noGrp="1"/>
+          </p:cNvSpPr>
+          <p:nvPr>
+            <p:ph type="body" idx="1"/>
+          </p:nvPr>
+        </p:nvSpPr>
+        <p:spPr/>
+        <p:txBody>
+          <a:bodyPr/>
+          <a:lstStyle/>
+          <a:p>
+            <a:pPr marL="171450" indent="-171450">
+              <a:buFontTx/>
+              <a:buChar char="-"/>
+            </a:pPr>
+            <a:r>
+              <a:rPr lang="en-GB" dirty="0"/>
+              <a:t>timeline</a:t>
+            </a:r>
+          </a:p>
+          <a:p>
+            <a:pPr marL="171450" indent="-171450">
+              <a:buFontTx/>
+              <a:buChar char="-"/>
+            </a:pPr>
+            <a:r>
+              <a:rPr lang="en-GB" dirty="0"/>
+              <a:t>annotation with start and end time point</a:t>
+            </a:r>
+          </a:p>
+        </p:txBody>
+      </p:sp>
+      <p:sp>
+        <p:nvSpPr>
+          <p:cNvPr id="4" name="Slide Number Placeholder 3"/>
+          <p:cNvSpPr>
+            <a:spLocks noGrp="1"/>
+          </p:cNvSpPr>
+          <p:nvPr>
+            <p:ph type="sldNum" sz="quarter" idx="10"/>
+          </p:nvPr>
+        </p:nvSpPr>
+        <p:spPr/>
+        <p:txBody>
+          <a:bodyPr/>
+          <a:lstStyle/>
+          <a:p>
+            <a:fld id="{2A6D38AD-DC69-7A49-A3BA-49389EBC1442}" type="slidenum">
+              <a:rPr lang="en-GB" smtClean="0"/>
+              <a:t>6</a:t>
+            </a:fld>
+            <a:endParaRPr lang="en-GB"/>
+          </a:p>
+        </p:txBody>
+      </p:sp>
+    </p:spTree>
+    <p:extLst>
+      <p:ext uri="{BB962C8B-B14F-4D97-AF65-F5344CB8AC3E}">
+        <p14:creationId xmlns:p14="http://schemas.microsoft.com/office/powerpoint/2010/main" val="834635339"/>
+      </p:ext>
+    </p:extLst>
+  </p:cSld>
+  <p:clrMapOvr>
+    <a:masterClrMapping/>
+  </p:clrMapOvr>
+</p:notes>
+</file>
+
+<file path=ppt/notesSlides/notesSlide4.xml><?xml version="1.0" encoding="utf-8"?>
+<p:notes xmlns:a="http://schemas.openxmlformats.org/drawingml/2006/main" xmlns:r="http://schemas.openxmlformats.org/officeDocument/2006/relationships" xmlns:p="http://schemas.openxmlformats.org/presentationml/2006/main">
+  <p:cSld>
+    <p:spTree>
+      <p:nvGrpSpPr>
+        <p:cNvPr id="1" name=""/>
+        <p:cNvGrpSpPr/>
+        <p:nvPr/>
+      </p:nvGrpSpPr>
+      <p:grpSpPr>
+        <a:xfrm>
+          <a:off x="0" y="0"/>
+          <a:ext cx="0" cy="0"/>
+          <a:chOff x="0" y="0"/>
+          <a:chExt cx="0" cy="0"/>
+        </a:xfrm>
+      </p:grpSpPr>
+      <p:sp>
+        <p:nvSpPr>
+          <p:cNvPr id="2" name="Slide Image Placeholder 1"/>
+          <p:cNvSpPr>
+            <a:spLocks noGrp="1" noRot="1" noChangeAspect="1"/>
+          </p:cNvSpPr>
+          <p:nvPr>
+            <p:ph type="sldImg"/>
+          </p:nvPr>
+        </p:nvSpPr>
+        <p:spPr/>
+      </p:sp>
+      <p:sp>
+        <p:nvSpPr>
+          <p:cNvPr id="3" name="Notes Placeholder 2"/>
+          <p:cNvSpPr>
+            <a:spLocks noGrp="1"/>
+          </p:cNvSpPr>
+          <p:nvPr>
+            <p:ph type="body" idx="1"/>
+          </p:nvPr>
+        </p:nvSpPr>
+        <p:spPr/>
+        <p:txBody>
+          <a:bodyPr/>
+          <a:lstStyle/>
+          <a:p>
+            <a:pPr marL="171450" marR="0" lvl="0" indent="-171450" algn="l" defTabSz="914400" rtl="0" eaLnBrk="1" fontAlgn="auto" latinLnBrk="0" hangingPunct="1">
+              <a:lnSpc>
+                <a:spcPct val="100000"/>
+              </a:lnSpc>
+              <a:spcBef>
+                <a:spcPts val="0"/>
+              </a:spcBef>
+              <a:spcAft>
+                <a:spcPts val="0"/>
+              </a:spcAft>
+              <a:buClrTx/>
+              <a:buSzTx/>
+              <a:buFontTx/>
+              <a:buChar char="-"/>
+              <a:tabLst/>
+              <a:defRPr/>
+            </a:pPr>
+            <a:r>
+              <a:rPr lang="en-GB" dirty="0"/>
+              <a:t>data interesting because: intervals, </a:t>
+            </a:r>
+            <a:r>
+              <a:rPr lang="en-GB" dirty="0" err="1"/>
+              <a:t>intervall</a:t>
+            </a:r>
+            <a:r>
+              <a:rPr lang="en-GB" dirty="0"/>
+              <a:t> from different modalities, modalities of different sources</a:t>
             </a:r>
           </a:p>
         </p:txBody>
@@ -589,7 +1183,521 @@
     </p:spTree>
     <p:extLst>
       <p:ext uri="{BB962C8B-B14F-4D97-AF65-F5344CB8AC3E}">
+        <p14:creationId xmlns:p14="http://schemas.microsoft.com/office/powerpoint/2010/main" val="1373761569"/>
+      </p:ext>
+    </p:extLst>
+  </p:cSld>
+  <p:clrMapOvr>
+    <a:masterClrMapping/>
+  </p:clrMapOvr>
+</p:notes>
+</file>
+
+<file path=ppt/notesSlides/notesSlide5.xml><?xml version="1.0" encoding="utf-8"?>
+<p:notes xmlns:a="http://schemas.openxmlformats.org/drawingml/2006/main" xmlns:r="http://schemas.openxmlformats.org/officeDocument/2006/relationships" xmlns:p="http://schemas.openxmlformats.org/presentationml/2006/main">
+  <p:cSld>
+    <p:spTree>
+      <p:nvGrpSpPr>
+        <p:cNvPr id="1" name=""/>
+        <p:cNvGrpSpPr/>
+        <p:nvPr/>
+      </p:nvGrpSpPr>
+      <p:grpSpPr>
+        <a:xfrm>
+          <a:off x="0" y="0"/>
+          <a:ext cx="0" cy="0"/>
+          <a:chOff x="0" y="0"/>
+          <a:chExt cx="0" cy="0"/>
+        </a:xfrm>
+      </p:grpSpPr>
+      <p:sp>
+        <p:nvSpPr>
+          <p:cNvPr id="2" name="Slide Image Placeholder 1"/>
+          <p:cNvSpPr>
+            <a:spLocks noGrp="1" noRot="1" noChangeAspect="1"/>
+          </p:cNvSpPr>
+          <p:nvPr>
+            <p:ph type="sldImg"/>
+          </p:nvPr>
+        </p:nvSpPr>
+        <p:spPr/>
+      </p:sp>
+      <p:sp>
+        <p:nvSpPr>
+          <p:cNvPr id="3" name="Notes Placeholder 2"/>
+          <p:cNvSpPr>
+            <a:spLocks noGrp="1"/>
+          </p:cNvSpPr>
+          <p:nvPr>
+            <p:ph type="body" idx="1"/>
+          </p:nvPr>
+        </p:nvSpPr>
+        <p:spPr/>
+        <p:txBody>
+          <a:bodyPr/>
+          <a:lstStyle/>
+          <a:p>
+            <a:r>
+              <a:rPr lang="en-GB" dirty="0"/>
+              <a:t>example shows {A} -&gt; {B}, {A} -&gt; {A, B} but not {B} -&gt; {A}</a:t>
+            </a:r>
+          </a:p>
+          <a:p>
+            <a:endParaRPr lang="en-GB" dirty="0"/>
+          </a:p>
+          <a:p>
+            <a:r>
+              <a:rPr lang="en-GB" dirty="0"/>
+              <a:t>NEXT: rule example video</a:t>
+            </a:r>
+          </a:p>
+        </p:txBody>
+      </p:sp>
+      <p:sp>
+        <p:nvSpPr>
+          <p:cNvPr id="4" name="Slide Number Placeholder 3"/>
+          <p:cNvSpPr>
+            <a:spLocks noGrp="1"/>
+          </p:cNvSpPr>
+          <p:nvPr>
+            <p:ph type="sldNum" sz="quarter" idx="10"/>
+          </p:nvPr>
+        </p:nvSpPr>
+        <p:spPr/>
+        <p:txBody>
+          <a:bodyPr/>
+          <a:lstStyle/>
+          <a:p>
+            <a:fld id="{2A6D38AD-DC69-7A49-A3BA-49389EBC1442}" type="slidenum">
+              <a:rPr lang="en-GB" smtClean="0"/>
+              <a:t>8</a:t>
+            </a:fld>
+            <a:endParaRPr lang="en-GB"/>
+          </a:p>
+        </p:txBody>
+      </p:sp>
+    </p:spTree>
+    <p:extLst>
+      <p:ext uri="{BB962C8B-B14F-4D97-AF65-F5344CB8AC3E}">
         <p14:creationId xmlns:p14="http://schemas.microsoft.com/office/powerpoint/2010/main" val="370206976"/>
+      </p:ext>
+    </p:extLst>
+  </p:cSld>
+  <p:clrMapOvr>
+    <a:masterClrMapping/>
+  </p:clrMapOvr>
+</p:notes>
+</file>
+
+<file path=ppt/notesSlides/notesSlide6.xml><?xml version="1.0" encoding="utf-8"?>
+<p:notes xmlns:a="http://schemas.openxmlformats.org/drawingml/2006/main" xmlns:r="http://schemas.openxmlformats.org/officeDocument/2006/relationships" xmlns:p="http://schemas.openxmlformats.org/presentationml/2006/main">
+  <p:cSld>
+    <p:spTree>
+      <p:nvGrpSpPr>
+        <p:cNvPr id="1" name=""/>
+        <p:cNvGrpSpPr/>
+        <p:nvPr/>
+      </p:nvGrpSpPr>
+      <p:grpSpPr>
+        <a:xfrm>
+          <a:off x="0" y="0"/>
+          <a:ext cx="0" cy="0"/>
+          <a:chOff x="0" y="0"/>
+          <a:chExt cx="0" cy="0"/>
+        </a:xfrm>
+      </p:grpSpPr>
+      <p:sp>
+        <p:nvSpPr>
+          <p:cNvPr id="2" name="Slide Image Placeholder 1"/>
+          <p:cNvSpPr>
+            <a:spLocks noGrp="1" noRot="1" noChangeAspect="1"/>
+          </p:cNvSpPr>
+          <p:nvPr>
+            <p:ph type="sldImg"/>
+          </p:nvPr>
+        </p:nvSpPr>
+        <p:spPr/>
+      </p:sp>
+      <p:sp>
+        <p:nvSpPr>
+          <p:cNvPr id="3" name="Notes Placeholder 2"/>
+          <p:cNvSpPr>
+            <a:spLocks noGrp="1"/>
+          </p:cNvSpPr>
+          <p:nvPr>
+            <p:ph type="body" idx="1"/>
+          </p:nvPr>
+        </p:nvSpPr>
+        <p:spPr/>
+        <p:txBody>
+          <a:bodyPr/>
+          <a:lstStyle/>
+          <a:p>
+            <a:r>
+              <a:rPr lang="en-GB" dirty="0"/>
+              <a:t>confidence: duration of occurrence of the rule divided by duration of occurrence of the premise</a:t>
+            </a:r>
+          </a:p>
+        </p:txBody>
+      </p:sp>
+      <p:sp>
+        <p:nvSpPr>
+          <p:cNvPr id="4" name="Slide Number Placeholder 3"/>
+          <p:cNvSpPr>
+            <a:spLocks noGrp="1"/>
+          </p:cNvSpPr>
+          <p:nvPr>
+            <p:ph type="sldNum" sz="quarter" idx="10"/>
+          </p:nvPr>
+        </p:nvSpPr>
+        <p:spPr/>
+        <p:txBody>
+          <a:bodyPr/>
+          <a:lstStyle/>
+          <a:p>
+            <a:fld id="{2A6D38AD-DC69-7A49-A3BA-49389EBC1442}" type="slidenum">
+              <a:rPr lang="en-GB" smtClean="0"/>
+              <a:t>9</a:t>
+            </a:fld>
+            <a:endParaRPr lang="en-GB"/>
+          </a:p>
+        </p:txBody>
+      </p:sp>
+    </p:spTree>
+    <p:extLst>
+      <p:ext uri="{BB962C8B-B14F-4D97-AF65-F5344CB8AC3E}">
+        <p14:creationId xmlns:p14="http://schemas.microsoft.com/office/powerpoint/2010/main" val="3059865610"/>
+      </p:ext>
+    </p:extLst>
+  </p:cSld>
+  <p:clrMapOvr>
+    <a:masterClrMapping/>
+  </p:clrMapOvr>
+</p:notes>
+</file>
+
+<file path=ppt/notesSlides/notesSlide7.xml><?xml version="1.0" encoding="utf-8"?>
+<p:notes xmlns:a="http://schemas.openxmlformats.org/drawingml/2006/main" xmlns:r="http://schemas.openxmlformats.org/officeDocument/2006/relationships" xmlns:p="http://schemas.openxmlformats.org/presentationml/2006/main">
+  <p:cSld>
+    <p:spTree>
+      <p:nvGrpSpPr>
+        <p:cNvPr id="1" name=""/>
+        <p:cNvGrpSpPr/>
+        <p:nvPr/>
+      </p:nvGrpSpPr>
+      <p:grpSpPr>
+        <a:xfrm>
+          <a:off x="0" y="0"/>
+          <a:ext cx="0" cy="0"/>
+          <a:chOff x="0" y="0"/>
+          <a:chExt cx="0" cy="0"/>
+        </a:xfrm>
+      </p:grpSpPr>
+      <p:sp>
+        <p:nvSpPr>
+          <p:cNvPr id="2" name="Slide Image Placeholder 1"/>
+          <p:cNvSpPr>
+            <a:spLocks noGrp="1" noRot="1" noChangeAspect="1"/>
+          </p:cNvSpPr>
+          <p:nvPr>
+            <p:ph type="sldImg"/>
+          </p:nvPr>
+        </p:nvSpPr>
+        <p:spPr/>
+      </p:sp>
+      <p:sp>
+        <p:nvSpPr>
+          <p:cNvPr id="3" name="Notes Placeholder 2"/>
+          <p:cNvSpPr>
+            <a:spLocks noGrp="1"/>
+          </p:cNvSpPr>
+          <p:nvPr>
+            <p:ph type="body" idx="1"/>
+          </p:nvPr>
+        </p:nvSpPr>
+        <p:spPr/>
+        <p:txBody>
+          <a:bodyPr/>
+          <a:lstStyle/>
+          <a:p>
+            <a:r>
+              <a:rPr lang="en-GB" dirty="0"/>
+              <a:t>choosing interesting rules: quantitative support for qualitative task</a:t>
+            </a:r>
+          </a:p>
+        </p:txBody>
+      </p:sp>
+      <p:sp>
+        <p:nvSpPr>
+          <p:cNvPr id="4" name="Slide Number Placeholder 3"/>
+          <p:cNvSpPr>
+            <a:spLocks noGrp="1"/>
+          </p:cNvSpPr>
+          <p:nvPr>
+            <p:ph type="sldNum" sz="quarter" idx="10"/>
+          </p:nvPr>
+        </p:nvSpPr>
+        <p:spPr/>
+        <p:txBody>
+          <a:bodyPr/>
+          <a:lstStyle/>
+          <a:p>
+            <a:fld id="{2A6D38AD-DC69-7A49-A3BA-49389EBC1442}" type="slidenum">
+              <a:rPr lang="en-GB" smtClean="0"/>
+              <a:t>10</a:t>
+            </a:fld>
+            <a:endParaRPr lang="en-GB"/>
+          </a:p>
+        </p:txBody>
+      </p:sp>
+    </p:spTree>
+    <p:extLst>
+      <p:ext uri="{BB962C8B-B14F-4D97-AF65-F5344CB8AC3E}">
+        <p14:creationId xmlns:p14="http://schemas.microsoft.com/office/powerpoint/2010/main" val="3396286407"/>
+      </p:ext>
+    </p:extLst>
+  </p:cSld>
+  <p:clrMapOvr>
+    <a:masterClrMapping/>
+  </p:clrMapOvr>
+</p:notes>
+</file>
+
+<file path=ppt/notesSlides/notesSlide8.xml><?xml version="1.0" encoding="utf-8"?>
+<p:notes xmlns:a="http://schemas.openxmlformats.org/drawingml/2006/main" xmlns:r="http://schemas.openxmlformats.org/officeDocument/2006/relationships" xmlns:p="http://schemas.openxmlformats.org/presentationml/2006/main">
+  <p:cSld>
+    <p:spTree>
+      <p:nvGrpSpPr>
+        <p:cNvPr id="1" name=""/>
+        <p:cNvGrpSpPr/>
+        <p:nvPr/>
+      </p:nvGrpSpPr>
+      <p:grpSpPr>
+        <a:xfrm>
+          <a:off x="0" y="0"/>
+          <a:ext cx="0" cy="0"/>
+          <a:chOff x="0" y="0"/>
+          <a:chExt cx="0" cy="0"/>
+        </a:xfrm>
+      </p:grpSpPr>
+      <p:sp>
+        <p:nvSpPr>
+          <p:cNvPr id="2" name="Slide Image Placeholder 1"/>
+          <p:cNvSpPr>
+            <a:spLocks noGrp="1" noRot="1" noChangeAspect="1"/>
+          </p:cNvSpPr>
+          <p:nvPr>
+            <p:ph type="sldImg"/>
+          </p:nvPr>
+        </p:nvSpPr>
+        <p:spPr/>
+      </p:sp>
+      <p:sp>
+        <p:nvSpPr>
+          <p:cNvPr id="3" name="Notes Placeholder 2"/>
+          <p:cNvSpPr>
+            <a:spLocks noGrp="1"/>
+          </p:cNvSpPr>
+          <p:nvPr>
+            <p:ph type="body" idx="1"/>
+          </p:nvPr>
+        </p:nvSpPr>
+        <p:spPr/>
+        <p:txBody>
+          <a:bodyPr/>
+          <a:lstStyle/>
+          <a:p>
+            <a:pPr marL="0" marR="0" lvl="0" indent="0" algn="l" defTabSz="914400" rtl="0" eaLnBrk="1" fontAlgn="auto" latinLnBrk="0" hangingPunct="1">
+              <a:lnSpc>
+                <a:spcPct val="100000"/>
+              </a:lnSpc>
+              <a:spcBef>
+                <a:spcPts val="0"/>
+              </a:spcBef>
+              <a:spcAft>
+                <a:spcPts val="0"/>
+              </a:spcAft>
+              <a:buClrTx/>
+              <a:buSzTx/>
+              <a:buFontTx/>
+              <a:buNone/>
+              <a:tabLst/>
+              <a:defRPr/>
+            </a:pPr>
+            <a:r>
+              <a:rPr lang="en-GB" dirty="0"/>
+              <a:t>Why null distributions? finding regularities</a:t>
+            </a:r>
+          </a:p>
+          <a:p>
+            <a:endParaRPr lang="en-GB" dirty="0"/>
+          </a:p>
+          <a:p>
+            <a:r>
+              <a:rPr lang="en-GB" dirty="0"/>
+              <a:t>when shuffling: make sure people only look one way</a:t>
+            </a:r>
+          </a:p>
+          <a:p>
+            <a:endParaRPr lang="en-GB" dirty="0"/>
+          </a:p>
+          <a:p>
+            <a:r>
+              <a:rPr lang="en-GB" dirty="0"/>
+              <a:t>show illogical null distribution first, highlight mistakes, then show logical one</a:t>
+            </a:r>
+          </a:p>
+        </p:txBody>
+      </p:sp>
+      <p:sp>
+        <p:nvSpPr>
+          <p:cNvPr id="4" name="Slide Number Placeholder 3"/>
+          <p:cNvSpPr>
+            <a:spLocks noGrp="1"/>
+          </p:cNvSpPr>
+          <p:nvPr>
+            <p:ph type="sldNum" sz="quarter" idx="10"/>
+          </p:nvPr>
+        </p:nvSpPr>
+        <p:spPr/>
+        <p:txBody>
+          <a:bodyPr/>
+          <a:lstStyle/>
+          <a:p>
+            <a:fld id="{2A6D38AD-DC69-7A49-A3BA-49389EBC1442}" type="slidenum">
+              <a:rPr lang="en-GB" smtClean="0"/>
+              <a:t>11</a:t>
+            </a:fld>
+            <a:endParaRPr lang="en-GB"/>
+          </a:p>
+        </p:txBody>
+      </p:sp>
+    </p:spTree>
+    <p:extLst>
+      <p:ext uri="{BB962C8B-B14F-4D97-AF65-F5344CB8AC3E}">
+        <p14:creationId xmlns:p14="http://schemas.microsoft.com/office/powerpoint/2010/main" val="2604992153"/>
+      </p:ext>
+    </p:extLst>
+  </p:cSld>
+  <p:clrMapOvr>
+    <a:masterClrMapping/>
+  </p:clrMapOvr>
+</p:notes>
+</file>
+
+<file path=ppt/notesSlides/notesSlide9.xml><?xml version="1.0" encoding="utf-8"?>
+<p:notes xmlns:a="http://schemas.openxmlformats.org/drawingml/2006/main" xmlns:r="http://schemas.openxmlformats.org/officeDocument/2006/relationships" xmlns:p="http://schemas.openxmlformats.org/presentationml/2006/main">
+  <p:cSld>
+    <p:spTree>
+      <p:nvGrpSpPr>
+        <p:cNvPr id="1" name=""/>
+        <p:cNvGrpSpPr/>
+        <p:nvPr/>
+      </p:nvGrpSpPr>
+      <p:grpSpPr>
+        <a:xfrm>
+          <a:off x="0" y="0"/>
+          <a:ext cx="0" cy="0"/>
+          <a:chOff x="0" y="0"/>
+          <a:chExt cx="0" cy="0"/>
+        </a:xfrm>
+      </p:grpSpPr>
+      <p:sp>
+        <p:nvSpPr>
+          <p:cNvPr id="2" name="Slide Image Placeholder 1"/>
+          <p:cNvSpPr>
+            <a:spLocks noGrp="1" noRot="1" noChangeAspect="1"/>
+          </p:cNvSpPr>
+          <p:nvPr>
+            <p:ph type="sldImg"/>
+          </p:nvPr>
+        </p:nvSpPr>
+        <p:spPr/>
+      </p:sp>
+      <p:sp>
+        <p:nvSpPr>
+          <p:cNvPr id="3" name="Notes Placeholder 2"/>
+          <p:cNvSpPr>
+            <a:spLocks noGrp="1"/>
+          </p:cNvSpPr>
+          <p:nvPr>
+            <p:ph type="body" idx="1"/>
+          </p:nvPr>
+        </p:nvSpPr>
+        <p:spPr/>
+        <p:txBody>
+          <a:bodyPr/>
+          <a:lstStyle/>
+          <a:p>
+            <a:pPr marL="0" marR="0" lvl="0" indent="0" algn="l" defTabSz="914400" rtl="0" eaLnBrk="1" fontAlgn="auto" latinLnBrk="0" hangingPunct="1">
+              <a:lnSpc>
+                <a:spcPct val="100000"/>
+              </a:lnSpc>
+              <a:spcBef>
+                <a:spcPts val="0"/>
+              </a:spcBef>
+              <a:spcAft>
+                <a:spcPts val="0"/>
+              </a:spcAft>
+              <a:buClrTx/>
+              <a:buSzTx/>
+              <a:buFontTx/>
+              <a:buNone/>
+              <a:tabLst/>
+              <a:defRPr/>
+            </a:pPr>
+            <a:r>
+              <a:rPr lang="en-GB" dirty="0"/>
+              <a:t>Why null distributions? finding regularities</a:t>
+            </a:r>
+          </a:p>
+          <a:p>
+            <a:endParaRPr lang="en-GB" dirty="0"/>
+          </a:p>
+          <a:p>
+            <a:r>
+              <a:rPr lang="en-GB" dirty="0"/>
+              <a:t>when shuffling: make sure people only look one way</a:t>
+            </a:r>
+          </a:p>
+          <a:p>
+            <a:endParaRPr lang="en-GB" dirty="0"/>
+          </a:p>
+          <a:p>
+            <a:r>
+              <a:rPr lang="en-GB" dirty="0"/>
+              <a:t>show illogical null distribution first, highlight mistakes, then show logical one</a:t>
+            </a:r>
+          </a:p>
+        </p:txBody>
+      </p:sp>
+      <p:sp>
+        <p:nvSpPr>
+          <p:cNvPr id="4" name="Slide Number Placeholder 3"/>
+          <p:cNvSpPr>
+            <a:spLocks noGrp="1"/>
+          </p:cNvSpPr>
+          <p:nvPr>
+            <p:ph type="sldNum" sz="quarter" idx="10"/>
+          </p:nvPr>
+        </p:nvSpPr>
+        <p:spPr/>
+        <p:txBody>
+          <a:bodyPr/>
+          <a:lstStyle/>
+          <a:p>
+            <a:fld id="{2A6D38AD-DC69-7A49-A3BA-49389EBC1442}" type="slidenum">
+              <a:rPr lang="en-GB" smtClean="0"/>
+              <a:t>12</a:t>
+            </a:fld>
+            <a:endParaRPr lang="en-GB"/>
+          </a:p>
+        </p:txBody>
+      </p:sp>
+    </p:spTree>
+    <p:extLst>
+      <p:ext uri="{BB962C8B-B14F-4D97-AF65-F5344CB8AC3E}">
+        <p14:creationId xmlns:p14="http://schemas.microsoft.com/office/powerpoint/2010/main" val="3370667160"/>
       </p:ext>
     </p:extLst>
   </p:cSld>
@@ -3942,7 +5050,7 @@
           <p:cNvPr id="2" name="Title 1">
             <a:extLst>
               <a:ext uri="{FF2B5EF4-FFF2-40B4-BE49-F238E27FC236}">
-                <a16:creationId xmlns:a16="http://schemas.microsoft.com/office/drawing/2014/main" id="{B59301A2-9C61-8C4D-ACB8-F7A1CDCDAC91}"/>
+                <a16:creationId xmlns:a16="http://schemas.microsoft.com/office/drawing/2014/main" id="{8BA98A31-BCA9-0E4B-86B7-F453EB0FEC2F}"/>
               </a:ext>
             </a:extLst>
           </p:cNvPr>
@@ -3953,53 +5061,30 @@
             <p:ph type="title"/>
           </p:nvPr>
         </p:nvSpPr>
-        <p:spPr/>
-        <p:txBody>
-          <a:bodyPr/>
-          <a:lstStyle/>
-          <a:p>
-            <a:r>
-              <a:rPr lang="en-GB" dirty="0"/>
-              <a:t>Significance – How?</a:t>
-            </a:r>
-          </a:p>
-        </p:txBody>
-      </p:sp>
-      <p:pic>
-        <p:nvPicPr>
-          <p:cNvPr id="6" name="Content Placeholder 5">
-            <a:extLst>
-              <a:ext uri="{FF2B5EF4-FFF2-40B4-BE49-F238E27FC236}">
-                <a16:creationId xmlns:a16="http://schemas.microsoft.com/office/drawing/2014/main" id="{AE4791D1-0D6D-274A-9969-838EFB02EBDF}"/>
-              </a:ext>
-            </a:extLst>
-          </p:cNvPr>
-          <p:cNvPicPr>
-            <a:picLocks noGrp="1" noChangeAspect="1"/>
-          </p:cNvPicPr>
-          <p:nvPr>
-            <p:ph idx="1"/>
-          </p:nvPr>
-        </p:nvPicPr>
-        <p:blipFill>
-          <a:blip r:embed="rId2"/>
-          <a:stretch>
-            <a:fillRect/>
-          </a:stretch>
-        </p:blipFill>
         <p:spPr>
           <a:xfrm>
-            <a:off x="1808091" y="1690688"/>
-            <a:ext cx="8575818" cy="4621212"/>
+            <a:off x="831850" y="1709739"/>
+            <a:ext cx="10515600" cy="1059588"/>
           </a:xfrm>
         </p:spPr>
-      </p:pic>
+        <p:txBody>
+          <a:bodyPr anchor="ctr"/>
+          <a:lstStyle/>
+          <a:p>
+            <a:pPr algn="ctr"/>
+            <a:r>
+              <a:rPr lang="en-GB" dirty="0"/>
+              <a:t>Why Significance?</a:t>
+            </a:r>
+          </a:p>
+        </p:txBody>
+      </p:sp>
       <p:sp>
         <p:nvSpPr>
           <p:cNvPr id="4" name="Slide Number Placeholder 3">
             <a:extLst>
               <a:ext uri="{FF2B5EF4-FFF2-40B4-BE49-F238E27FC236}">
-                <a16:creationId xmlns:a16="http://schemas.microsoft.com/office/drawing/2014/main" id="{5E471C80-F3F9-9446-9D10-446D1A1ADC1A}"/>
+                <a16:creationId xmlns:a16="http://schemas.microsoft.com/office/drawing/2014/main" id="{65771944-544F-694A-A9E6-376191B2C6AC}"/>
               </a:ext>
             </a:extLst>
           </p:cNvPr>
@@ -4019,20 +5104,157 @@
               <a:rPr lang="en-GB" smtClean="0"/>
               <a:t>10</a:t>
             </a:fld>
-            <a:endParaRPr lang="en-GB" dirty="0"/>
+            <a:endParaRPr lang="en-GB"/>
+          </a:p>
+        </p:txBody>
+      </p:sp>
+      <p:sp>
+        <p:nvSpPr>
+          <p:cNvPr id="5" name="Rounded Rectangle 4">
+            <a:extLst>
+              <a:ext uri="{FF2B5EF4-FFF2-40B4-BE49-F238E27FC236}">
+                <a16:creationId xmlns:a16="http://schemas.microsoft.com/office/drawing/2014/main" id="{93D8AB72-55D5-F74E-8328-67A096269ED4}"/>
+              </a:ext>
+            </a:extLst>
+          </p:cNvPr>
+          <p:cNvSpPr/>
+          <p:nvPr/>
+        </p:nvSpPr>
+        <p:spPr>
+          <a:xfrm>
+            <a:off x="1724297" y="3866605"/>
+            <a:ext cx="8730706" cy="914400"/>
+          </a:xfrm>
+          <a:prstGeom prst="roundRect">
+            <a:avLst/>
+          </a:prstGeom>
+          <a:noFill/>
+          <a:ln>
+            <a:solidFill>
+              <a:schemeClr val="tx1"/>
+            </a:solidFill>
+          </a:ln>
+        </p:spPr>
+        <p:style>
+          <a:lnRef idx="2">
+            <a:schemeClr val="accent1">
+              <a:shade val="50000"/>
+            </a:schemeClr>
+          </a:lnRef>
+          <a:fillRef idx="1">
+            <a:schemeClr val="accent1"/>
+          </a:fillRef>
+          <a:effectRef idx="0">
+            <a:schemeClr val="accent1"/>
+          </a:effectRef>
+          <a:fontRef idx="minor">
+            <a:schemeClr val="lt1"/>
+          </a:fontRef>
+        </p:style>
+        <p:txBody>
+          <a:bodyPr rtlCol="0" anchor="ctr"/>
+          <a:lstStyle/>
+          <a:p>
+            <a:pPr algn="ctr"/>
+            <a:r>
+              <a:rPr lang="en-GB" sz="2800" dirty="0">
+                <a:solidFill>
+                  <a:schemeClr val="tx1"/>
+                </a:solidFill>
+              </a:rPr>
+              <a:t>qualitative						quantitative</a:t>
+            </a:r>
           </a:p>
         </p:txBody>
       </p:sp>
     </p:spTree>
     <p:extLst>
       <p:ext uri="{BB962C8B-B14F-4D97-AF65-F5344CB8AC3E}">
-        <p14:creationId xmlns:p14="http://schemas.microsoft.com/office/powerpoint/2010/main" val="3742017334"/>
+        <p14:creationId xmlns:p14="http://schemas.microsoft.com/office/powerpoint/2010/main" val="4284484028"/>
       </p:ext>
     </p:extLst>
   </p:cSld>
   <p:clrMapOvr>
     <a:masterClrMapping/>
   </p:clrMapOvr>
+  <p:timing>
+    <p:tnLst>
+      <p:par>
+        <p:cTn id="1" dur="indefinite" restart="never" nodeType="tmRoot">
+          <p:childTnLst>
+            <p:seq concurrent="1" nextAc="seek">
+              <p:cTn id="2" dur="indefinite" nodeType="mainSeq">
+                <p:childTnLst>
+                  <p:par>
+                    <p:cTn id="3" fill="hold">
+                      <p:stCondLst>
+                        <p:cond delay="indefinite"/>
+                      </p:stCondLst>
+                      <p:childTnLst>
+                        <p:par>
+                          <p:cTn id="4" fill="hold">
+                            <p:stCondLst>
+                              <p:cond delay="0"/>
+                            </p:stCondLst>
+                            <p:childTnLst>
+                              <p:par>
+                                <p:cTn id="5" presetID="1" presetClass="entr" presetSubtype="0" fill="hold" grpId="0" nodeType="clickEffect">
+                                  <p:stCondLst>
+                                    <p:cond delay="0"/>
+                                  </p:stCondLst>
+                                  <p:childTnLst>
+                                    <p:set>
+                                      <p:cBhvr>
+                                        <p:cTn id="6" dur="1" fill="hold">
+                                          <p:stCondLst>
+                                            <p:cond delay="0"/>
+                                          </p:stCondLst>
+                                        </p:cTn>
+                                        <p:tgtEl>
+                                          <p:spTgt spid="5"/>
+                                        </p:tgtEl>
+                                        <p:attrNameLst>
+                                          <p:attrName>style.visibility</p:attrName>
+                                        </p:attrNameLst>
+                                      </p:cBhvr>
+                                      <p:to>
+                                        <p:strVal val="visible"/>
+                                      </p:to>
+                                    </p:set>
+                                  </p:childTnLst>
+                                </p:cTn>
+                              </p:par>
+                            </p:childTnLst>
+                          </p:cTn>
+                        </p:par>
+                      </p:childTnLst>
+                    </p:cTn>
+                  </p:par>
+                </p:childTnLst>
+              </p:cTn>
+              <p:prevCondLst>
+                <p:cond evt="onPrev" delay="0">
+                  <p:tgtEl>
+                    <p:sldTgt/>
+                  </p:tgtEl>
+                </p:cond>
+              </p:prevCondLst>
+              <p:nextCondLst>
+                <p:cond evt="onNext" delay="0">
+                  <p:tgtEl>
+                    <p:sldTgt/>
+                  </p:tgtEl>
+                </p:cond>
+              </p:nextCondLst>
+            </p:seq>
+          </p:childTnLst>
+        </p:cTn>
+      </p:par>
+    </p:tnLst>
+    <p:bldLst>
+      <p:bldP spid="5" grpId="0" animBg="1"/>
+    </p:bldLst>
+  </p:timing>
 </p:sld>
 </file>
 
@@ -4071,40 +5293,116 @@
         </p:nvSpPr>
         <p:spPr/>
         <p:txBody>
-          <a:bodyPr>
-            <a:normAutofit/>
-          </a:bodyPr>
-          <a:lstStyle/>
-          <a:p>
-            <a:r>
-              <a:rPr lang="en-GB" sz="4800" dirty="0"/>
-              <a:t>Interpretation – Things to Keep in Mind</a:t>
-            </a:r>
-          </a:p>
-        </p:txBody>
-      </p:sp>
-      <p:sp>
-        <p:nvSpPr>
-          <p:cNvPr id="5" name="Text Placeholder 4">
-            <a:extLst>
-              <a:ext uri="{FF2B5EF4-FFF2-40B4-BE49-F238E27FC236}">
-                <a16:creationId xmlns:a16="http://schemas.microsoft.com/office/drawing/2014/main" id="{AE3A1F98-1572-E14F-B29B-99EC29BF977A}"/>
-              </a:ext>
-            </a:extLst>
-          </p:cNvPr>
-          <p:cNvSpPr>
-            <a:spLocks noGrp="1"/>
-          </p:cNvSpPr>
-          <p:nvPr>
-            <p:ph type="body" idx="1"/>
-          </p:nvPr>
-        </p:nvSpPr>
-        <p:spPr/>
-        <p:txBody>
-          <a:bodyPr/>
-          <a:lstStyle/>
-          <a:p>
-            <a:endParaRPr lang="en-GB"/>
+          <a:bodyPr/>
+          <a:lstStyle/>
+          <a:p>
+            <a:r>
+              <a:rPr lang="en-GB" dirty="0"/>
+              <a:t>Significance – How?</a:t>
+            </a:r>
+          </a:p>
+        </p:txBody>
+      </p:sp>
+      <p:pic>
+        <p:nvPicPr>
+          <p:cNvPr id="6" name="Content Placeholder 5">
+            <a:extLst>
+              <a:ext uri="{FF2B5EF4-FFF2-40B4-BE49-F238E27FC236}">
+                <a16:creationId xmlns:a16="http://schemas.microsoft.com/office/drawing/2014/main" id="{AE4791D1-0D6D-274A-9969-838EFB02EBDF}"/>
+              </a:ext>
+            </a:extLst>
+          </p:cNvPr>
+          <p:cNvPicPr>
+            <a:picLocks noGrp="1" noChangeAspect="1"/>
+          </p:cNvPicPr>
+          <p:nvPr>
+            <p:ph type="pic" idx="1"/>
+          </p:nvPr>
+        </p:nvPicPr>
+        <p:blipFill>
+          <a:blip r:embed="rId3"/>
+          <a:stretch>
+            <a:fillRect/>
+          </a:stretch>
+        </p:blipFill>
+        <p:spPr>
+          <a:xfrm>
+            <a:off x="4115881" y="1811254"/>
+            <a:ext cx="7399072" cy="4299100"/>
+          </a:xfrm>
+        </p:spPr>
+      </p:pic>
+      <p:sp>
+        <p:nvSpPr>
+          <p:cNvPr id="3" name="Text Placeholder 2">
+            <a:extLst>
+              <a:ext uri="{FF2B5EF4-FFF2-40B4-BE49-F238E27FC236}">
+                <a16:creationId xmlns:a16="http://schemas.microsoft.com/office/drawing/2014/main" id="{6409B9E8-21DD-FD4D-9311-324BB9BC34AB}"/>
+              </a:ext>
+            </a:extLst>
+          </p:cNvPr>
+          <p:cNvSpPr>
+            <a:spLocks noGrp="1"/>
+          </p:cNvSpPr>
+          <p:nvPr>
+            <p:ph type="body" sz="half" idx="2"/>
+          </p:nvPr>
+        </p:nvSpPr>
+        <p:spPr>
+          <a:xfrm>
+            <a:off x="839788" y="2057400"/>
+            <a:ext cx="3164399" cy="3811588"/>
+          </a:xfrm>
+        </p:spPr>
+        <p:txBody>
+          <a:bodyPr anchor="ctr"/>
+          <a:lstStyle/>
+          <a:p>
+            <a:pPr marL="342900" indent="-342900">
+              <a:buFont typeface="+mj-lt"/>
+              <a:buAutoNum type="arabicPeriod"/>
+            </a:pPr>
+            <a:r>
+              <a:rPr lang="en-GB" dirty="0"/>
+              <a:t>create 100 null distributions for every real sequence</a:t>
+            </a:r>
+          </a:p>
+          <a:p>
+            <a:pPr marL="342900" indent="-342900">
+              <a:buFont typeface="+mj-lt"/>
+              <a:buAutoNum type="arabicPeriod"/>
+            </a:pPr>
+            <a:r>
+              <a:rPr lang="en-GB" dirty="0"/>
+              <a:t>take batches of 10:</a:t>
+            </a:r>
+            <a:br>
+              <a:rPr lang="en-GB" dirty="0"/>
+            </a:br>
+            <a:r>
+              <a:rPr lang="en-GB" dirty="0"/>
+              <a:t>1 null distributions from each real distribution</a:t>
+            </a:r>
+          </a:p>
+          <a:p>
+            <a:pPr marL="342900" indent="-342900">
+              <a:buFont typeface="+mj-lt"/>
+              <a:buAutoNum type="arabicPeriod"/>
+            </a:pPr>
+            <a:r>
+              <a:rPr lang="en-GB" dirty="0"/>
+              <a:t>create distribution for every rule</a:t>
+            </a:r>
+          </a:p>
+          <a:p>
+            <a:pPr marL="342900" indent="-342900">
+              <a:buFont typeface="+mj-lt"/>
+              <a:buAutoNum type="arabicPeriod"/>
+            </a:pPr>
+            <a:r>
+              <a:rPr lang="en-GB" dirty="0"/>
+              <a:t>check real observation for significance against null observation distribution</a:t>
+            </a:r>
           </a:p>
         </p:txBody>
       </p:sp>
@@ -4113,7 +5411,7 @@
           <p:cNvPr id="4" name="Slide Number Placeholder 3">
             <a:extLst>
               <a:ext uri="{FF2B5EF4-FFF2-40B4-BE49-F238E27FC236}">
-                <a16:creationId xmlns:a16="http://schemas.microsoft.com/office/drawing/2014/main" id="{92C00CBE-9A88-CC4A-9788-916F84EDDFCB}"/>
+                <a16:creationId xmlns:a16="http://schemas.microsoft.com/office/drawing/2014/main" id="{5E471C80-F3F9-9446-9D10-446D1A1ADC1A}"/>
               </a:ext>
             </a:extLst>
           </p:cNvPr>
@@ -4140,7 +5438,7 @@
     </p:spTree>
     <p:extLst>
       <p:ext uri="{BB962C8B-B14F-4D97-AF65-F5344CB8AC3E}">
-        <p14:creationId xmlns:p14="http://schemas.microsoft.com/office/powerpoint/2010/main" val="3418532346"/>
+        <p14:creationId xmlns:p14="http://schemas.microsoft.com/office/powerpoint/2010/main" val="3742017334"/>
       </p:ext>
     </p:extLst>
   </p:cSld>
@@ -4190,56 +5488,109 @@
           <a:p>
             <a:r>
               <a:rPr lang="en-GB" dirty="0"/>
-              <a:t>Interpretation – Things to Keep in Mind</a:t>
-            </a:r>
-          </a:p>
-        </p:txBody>
-      </p:sp>
-      <p:sp>
-        <p:nvSpPr>
-          <p:cNvPr id="3" name="Content Placeholder 2">
-            <a:extLst>
-              <a:ext uri="{FF2B5EF4-FFF2-40B4-BE49-F238E27FC236}">
-                <a16:creationId xmlns:a16="http://schemas.microsoft.com/office/drawing/2014/main" id="{CAF45B0D-B8E5-E449-A666-D3C6BC5ECD3C}"/>
-              </a:ext>
-            </a:extLst>
-          </p:cNvPr>
-          <p:cNvSpPr>
-            <a:spLocks noGrp="1"/>
-          </p:cNvSpPr>
-          <p:nvPr>
-            <p:ph idx="1"/>
-          </p:nvPr>
-        </p:nvSpPr>
-        <p:spPr/>
-        <p:txBody>
-          <a:bodyPr/>
-          <a:lstStyle/>
-          <a:p>
+              <a:t>Significance – How?</a:t>
+            </a:r>
+          </a:p>
+        </p:txBody>
+      </p:sp>
+      <p:pic>
+        <p:nvPicPr>
+          <p:cNvPr id="6" name="Content Placeholder 5">
+            <a:extLst>
+              <a:ext uri="{FF2B5EF4-FFF2-40B4-BE49-F238E27FC236}">
+                <a16:creationId xmlns:a16="http://schemas.microsoft.com/office/drawing/2014/main" id="{AE4791D1-0D6D-274A-9969-838EFB02EBDF}"/>
+              </a:ext>
+            </a:extLst>
+          </p:cNvPr>
+          <p:cNvPicPr>
+            <a:picLocks noGrp="1" noChangeAspect="1"/>
+          </p:cNvPicPr>
+          <p:nvPr>
+            <p:ph type="pic" idx="1"/>
+          </p:nvPr>
+        </p:nvPicPr>
+        <p:blipFill rotWithShape="1">
+          <a:blip r:embed="rId3"/>
+          <a:srcRect l="-11" r="90"/>
+          <a:stretch/>
+        </p:blipFill>
+        <p:spPr>
+          <a:xfrm>
+            <a:off x="4277033" y="2052619"/>
+            <a:ext cx="7076768" cy="3816369"/>
+          </a:xfrm>
+        </p:spPr>
+      </p:pic>
+      <p:sp>
+        <p:nvSpPr>
+          <p:cNvPr id="3" name="Text Placeholder 2">
+            <a:extLst>
+              <a:ext uri="{FF2B5EF4-FFF2-40B4-BE49-F238E27FC236}">
+                <a16:creationId xmlns:a16="http://schemas.microsoft.com/office/drawing/2014/main" id="{6409B9E8-21DD-FD4D-9311-324BB9BC34AB}"/>
+              </a:ext>
+            </a:extLst>
+          </p:cNvPr>
+          <p:cNvSpPr>
+            <a:spLocks noGrp="1"/>
+          </p:cNvSpPr>
+          <p:nvPr>
+            <p:ph type="body" sz="half" idx="2"/>
+          </p:nvPr>
+        </p:nvSpPr>
+        <p:spPr>
+          <a:xfrm>
+            <a:off x="839788" y="2057400"/>
+            <a:ext cx="3164399" cy="3811588"/>
+          </a:xfrm>
+        </p:spPr>
+        <p:txBody>
+          <a:bodyPr anchor="ctr"/>
+          <a:lstStyle/>
+          <a:p>
+            <a:pPr marL="342900" indent="-342900">
+              <a:buFont typeface="+mj-lt"/>
+              <a:buAutoNum type="arabicPeriod"/>
+            </a:pPr>
             <a:r>
               <a:rPr lang="en-GB" dirty="0"/>
-              <a:t>numerical vs applied significance</a:t>
-            </a:r>
-          </a:p>
-          <a:p>
-            <a:endParaRPr lang="en-GB" dirty="0"/>
-          </a:p>
-          <a:p>
+              <a:t>create 100 null distributions for every real sequence</a:t>
+            </a:r>
+          </a:p>
+          <a:p>
+            <a:pPr marL="342900" indent="-342900">
+              <a:buFont typeface="+mj-lt"/>
+              <a:buAutoNum type="arabicPeriod"/>
+            </a:pPr>
             <a:r>
               <a:rPr lang="en-GB" dirty="0"/>
-              <a:t>rules confirming existing research</a:t>
-            </a:r>
-          </a:p>
-          <a:p>
-            <a:r>
+              <a:t>take batches of 10:</a:t>
+            </a:r>
+            <a:br>
               <a:rPr lang="en-GB" dirty="0"/>
-              <a:t>new ”interesting” rules (whatever that means)</a:t>
-            </a:r>
-          </a:p>
-          <a:p>
+            </a:br>
             <a:r>
               <a:rPr lang="en-GB" dirty="0"/>
-              <a:t>possible hypotheses generated from new rules</a:t>
+              <a:t>1 null distributions from each real distribution</a:t>
+            </a:r>
+          </a:p>
+          <a:p>
+            <a:pPr marL="342900" indent="-342900">
+              <a:buFont typeface="+mj-lt"/>
+              <a:buAutoNum type="arabicPeriod"/>
+            </a:pPr>
+            <a:r>
+              <a:rPr lang="en-GB" dirty="0"/>
+              <a:t>create distribution for every rule</a:t>
+            </a:r>
+          </a:p>
+          <a:p>
+            <a:pPr marL="342900" indent="-342900">
+              <a:buFont typeface="+mj-lt"/>
+              <a:buAutoNum type="arabicPeriod"/>
+            </a:pPr>
+            <a:r>
+              <a:rPr lang="en-GB" dirty="0"/>
+              <a:t>check real observation for significance against null observation distribution</a:t>
             </a:r>
           </a:p>
         </p:txBody>
@@ -4249,7 +5600,7 @@
           <p:cNvPr id="4" name="Slide Number Placeholder 3">
             <a:extLst>
               <a:ext uri="{FF2B5EF4-FFF2-40B4-BE49-F238E27FC236}">
-                <a16:creationId xmlns:a16="http://schemas.microsoft.com/office/drawing/2014/main" id="{92C00CBE-9A88-CC4A-9788-916F84EDDFCB}"/>
+                <a16:creationId xmlns:a16="http://schemas.microsoft.com/office/drawing/2014/main" id="{5E471C80-F3F9-9446-9D10-446D1A1ADC1A}"/>
               </a:ext>
             </a:extLst>
           </p:cNvPr>
@@ -4276,7 +5627,235 @@
     </p:spTree>
     <p:extLst>
       <p:ext uri="{BB962C8B-B14F-4D97-AF65-F5344CB8AC3E}">
-        <p14:creationId xmlns:p14="http://schemas.microsoft.com/office/powerpoint/2010/main" val="1712662531"/>
+        <p14:creationId xmlns:p14="http://schemas.microsoft.com/office/powerpoint/2010/main" val="696171481"/>
+      </p:ext>
+    </p:extLst>
+  </p:cSld>
+  <p:clrMapOvr>
+    <a:masterClrMapping/>
+  </p:clrMapOvr>
+</p:sld>
+</file>
+
+<file path=ppt/slides/slide13.xml><?xml version="1.0" encoding="utf-8"?>
+<p:sld xmlns:a="http://schemas.openxmlformats.org/drawingml/2006/main" xmlns:r="http://schemas.openxmlformats.org/officeDocument/2006/relationships" xmlns:p="http://schemas.openxmlformats.org/presentationml/2006/main">
+  <p:cSld>
+    <p:spTree>
+      <p:nvGrpSpPr>
+        <p:cNvPr id="1" name=""/>
+        <p:cNvGrpSpPr/>
+        <p:nvPr/>
+      </p:nvGrpSpPr>
+      <p:grpSpPr>
+        <a:xfrm>
+          <a:off x="0" y="0"/>
+          <a:ext cx="0" cy="0"/>
+          <a:chOff x="0" y="0"/>
+          <a:chExt cx="0" cy="0"/>
+        </a:xfrm>
+      </p:grpSpPr>
+      <p:sp>
+        <p:nvSpPr>
+          <p:cNvPr id="2" name="Title 1">
+            <a:extLst>
+              <a:ext uri="{FF2B5EF4-FFF2-40B4-BE49-F238E27FC236}">
+                <a16:creationId xmlns:a16="http://schemas.microsoft.com/office/drawing/2014/main" id="{B59301A2-9C61-8C4D-ACB8-F7A1CDCDAC91}"/>
+              </a:ext>
+            </a:extLst>
+          </p:cNvPr>
+          <p:cNvSpPr>
+            <a:spLocks noGrp="1"/>
+          </p:cNvSpPr>
+          <p:nvPr>
+            <p:ph type="title"/>
+          </p:nvPr>
+        </p:nvSpPr>
+        <p:spPr/>
+        <p:txBody>
+          <a:bodyPr>
+            <a:normAutofit/>
+          </a:bodyPr>
+          <a:lstStyle/>
+          <a:p>
+            <a:r>
+              <a:rPr lang="en-GB" sz="4800" dirty="0"/>
+              <a:t>Interpretation – Things to Keep in Mind</a:t>
+            </a:r>
+          </a:p>
+        </p:txBody>
+      </p:sp>
+      <p:sp>
+        <p:nvSpPr>
+          <p:cNvPr id="5" name="Text Placeholder 4">
+            <a:extLst>
+              <a:ext uri="{FF2B5EF4-FFF2-40B4-BE49-F238E27FC236}">
+                <a16:creationId xmlns:a16="http://schemas.microsoft.com/office/drawing/2014/main" id="{AE3A1F98-1572-E14F-B29B-99EC29BF977A}"/>
+              </a:ext>
+            </a:extLst>
+          </p:cNvPr>
+          <p:cNvSpPr>
+            <a:spLocks noGrp="1"/>
+          </p:cNvSpPr>
+          <p:nvPr>
+            <p:ph type="body" idx="1"/>
+          </p:nvPr>
+        </p:nvSpPr>
+        <p:spPr/>
+        <p:txBody>
+          <a:bodyPr/>
+          <a:lstStyle/>
+          <a:p>
+            <a:endParaRPr lang="en-GB"/>
+          </a:p>
+        </p:txBody>
+      </p:sp>
+      <p:sp>
+        <p:nvSpPr>
+          <p:cNvPr id="4" name="Slide Number Placeholder 3">
+            <a:extLst>
+              <a:ext uri="{FF2B5EF4-FFF2-40B4-BE49-F238E27FC236}">
+                <a16:creationId xmlns:a16="http://schemas.microsoft.com/office/drawing/2014/main" id="{92C00CBE-9A88-CC4A-9788-916F84EDDFCB}"/>
+              </a:ext>
+            </a:extLst>
+          </p:cNvPr>
+          <p:cNvSpPr>
+            <a:spLocks noGrp="1"/>
+          </p:cNvSpPr>
+          <p:nvPr>
+            <p:ph type="sldNum" sz="quarter" idx="12"/>
+          </p:nvPr>
+        </p:nvSpPr>
+        <p:spPr/>
+        <p:txBody>
+          <a:bodyPr/>
+          <a:lstStyle/>
+          <a:p>
+            <a:fld id="{1EF241A2-0DEB-384D-A4D9-E11D0A62C4FD}" type="slidenum">
+              <a:rPr lang="en-GB" smtClean="0"/>
+              <a:t>13</a:t>
+            </a:fld>
+            <a:endParaRPr lang="en-GB" dirty="0"/>
+          </a:p>
+        </p:txBody>
+      </p:sp>
+    </p:spTree>
+    <p:extLst>
+      <p:ext uri="{BB962C8B-B14F-4D97-AF65-F5344CB8AC3E}">
+        <p14:creationId xmlns:p14="http://schemas.microsoft.com/office/powerpoint/2010/main" val="3418532346"/>
+      </p:ext>
+    </p:extLst>
+  </p:cSld>
+  <p:clrMapOvr>
+    <a:masterClrMapping/>
+  </p:clrMapOvr>
+</p:sld>
+</file>
+
+<file path=ppt/slides/slide14.xml><?xml version="1.0" encoding="utf-8"?>
+<p:sld xmlns:a="http://schemas.openxmlformats.org/drawingml/2006/main" xmlns:r="http://schemas.openxmlformats.org/officeDocument/2006/relationships" xmlns:p="http://schemas.openxmlformats.org/presentationml/2006/main">
+  <p:cSld>
+    <p:spTree>
+      <p:nvGrpSpPr>
+        <p:cNvPr id="1" name=""/>
+        <p:cNvGrpSpPr/>
+        <p:nvPr/>
+      </p:nvGrpSpPr>
+      <p:grpSpPr>
+        <a:xfrm>
+          <a:off x="0" y="0"/>
+          <a:ext cx="0" cy="0"/>
+          <a:chOff x="0" y="0"/>
+          <a:chExt cx="0" cy="0"/>
+        </a:xfrm>
+      </p:grpSpPr>
+      <p:sp>
+        <p:nvSpPr>
+          <p:cNvPr id="2" name="Title 1">
+            <a:extLst>
+              <a:ext uri="{FF2B5EF4-FFF2-40B4-BE49-F238E27FC236}">
+                <a16:creationId xmlns:a16="http://schemas.microsoft.com/office/drawing/2014/main" id="{B59301A2-9C61-8C4D-ACB8-F7A1CDCDAC91}"/>
+              </a:ext>
+            </a:extLst>
+          </p:cNvPr>
+          <p:cNvSpPr>
+            <a:spLocks noGrp="1"/>
+          </p:cNvSpPr>
+          <p:nvPr>
+            <p:ph type="title"/>
+          </p:nvPr>
+        </p:nvSpPr>
+        <p:spPr/>
+        <p:txBody>
+          <a:bodyPr>
+            <a:normAutofit/>
+          </a:bodyPr>
+          <a:lstStyle/>
+          <a:p>
+            <a:r>
+              <a:rPr lang="en-GB" sz="4800" dirty="0"/>
+              <a:t>Interpretation – Things to Look for</a:t>
+            </a:r>
+          </a:p>
+        </p:txBody>
+      </p:sp>
+      <p:sp>
+        <p:nvSpPr>
+          <p:cNvPr id="5" name="Text Placeholder 4">
+            <a:extLst>
+              <a:ext uri="{FF2B5EF4-FFF2-40B4-BE49-F238E27FC236}">
+                <a16:creationId xmlns:a16="http://schemas.microsoft.com/office/drawing/2014/main" id="{AE3A1F98-1572-E14F-B29B-99EC29BF977A}"/>
+              </a:ext>
+            </a:extLst>
+          </p:cNvPr>
+          <p:cNvSpPr>
+            <a:spLocks noGrp="1"/>
+          </p:cNvSpPr>
+          <p:nvPr>
+            <p:ph type="body" idx="1"/>
+          </p:nvPr>
+        </p:nvSpPr>
+        <p:spPr/>
+        <p:txBody>
+          <a:bodyPr/>
+          <a:lstStyle/>
+          <a:p>
+            <a:endParaRPr lang="en-GB"/>
+          </a:p>
+        </p:txBody>
+      </p:sp>
+      <p:sp>
+        <p:nvSpPr>
+          <p:cNvPr id="4" name="Slide Number Placeholder 3">
+            <a:extLst>
+              <a:ext uri="{FF2B5EF4-FFF2-40B4-BE49-F238E27FC236}">
+                <a16:creationId xmlns:a16="http://schemas.microsoft.com/office/drawing/2014/main" id="{92C00CBE-9A88-CC4A-9788-916F84EDDFCB}"/>
+              </a:ext>
+            </a:extLst>
+          </p:cNvPr>
+          <p:cNvSpPr>
+            <a:spLocks noGrp="1"/>
+          </p:cNvSpPr>
+          <p:nvPr>
+            <p:ph type="sldNum" sz="quarter" idx="12"/>
+          </p:nvPr>
+        </p:nvSpPr>
+        <p:spPr/>
+        <p:txBody>
+          <a:bodyPr/>
+          <a:lstStyle/>
+          <a:p>
+            <a:fld id="{1EF241A2-0DEB-384D-A4D9-E11D0A62C4FD}" type="slidenum">
+              <a:rPr lang="en-GB" smtClean="0"/>
+              <a:t>14</a:t>
+            </a:fld>
+            <a:endParaRPr lang="en-GB" dirty="0"/>
+          </a:p>
+        </p:txBody>
+      </p:sp>
+    </p:spTree>
+    <p:extLst>
+      <p:ext uri="{BB962C8B-B14F-4D97-AF65-F5344CB8AC3E}">
+        <p14:creationId xmlns:p14="http://schemas.microsoft.com/office/powerpoint/2010/main" val="387597680"/>
       </p:ext>
     </p:extLst>
   </p:cSld>
@@ -4508,7 +6087,7 @@
           </p:nvPr>
         </p:nvPicPr>
         <p:blipFill>
-          <a:blip r:embed="rId2"/>
+          <a:blip r:embed="rId3"/>
           <a:stretch>
             <a:fillRect/>
           </a:stretch>
@@ -4557,11 +6136,8 @@
           <a:p>
             <a:r>
               <a:rPr lang="en-GB" dirty="0"/>
-              <a:t>present in vocal and gestural modality</a:t>
-            </a:r>
-          </a:p>
-          <a:p>
-            <a:endParaRPr lang="en-GB" dirty="0"/>
+              <a:t>present in early infancy</a:t>
+            </a:r>
           </a:p>
         </p:txBody>
       </p:sp>
@@ -4608,7 +6184,7 @@
 </file>
 
 <file path=ppt/slides/slide4.xml><?xml version="1.0" encoding="utf-8"?>
-<p:sld xmlns:a="http://schemas.openxmlformats.org/drawingml/2006/main" xmlns:r="http://schemas.openxmlformats.org/officeDocument/2006/relationships" xmlns:p="http://schemas.openxmlformats.org/presentationml/2006/main">
+<p:sld xmlns:a="http://schemas.openxmlformats.org/drawingml/2006/main" xmlns:r="http://schemas.openxmlformats.org/officeDocument/2006/relationships" xmlns:p="http://schemas.openxmlformats.org/presentationml/2006/main" show="0">
   <p:cSld>
     <p:spTree>
       <p:nvGrpSpPr>
@@ -4855,7 +6431,7 @@
           </p:nvPr>
         </p:nvPicPr>
         <p:blipFill>
-          <a:blip r:embed="rId2"/>
+          <a:blip r:embed="rId3"/>
           <a:stretch>
             <a:fillRect/>
           </a:stretch>
@@ -4971,7 +6547,7 @@
           </p:nvPr>
         </p:nvPicPr>
         <p:blipFill rotWithShape="1">
-          <a:blip r:embed="rId2"/>
+          <a:blip r:embed="rId3"/>
           <a:srcRect r="51698"/>
           <a:stretch/>
         </p:blipFill>
@@ -5064,8 +6640,341 @@
           <a:p>
             <a:r>
               <a:rPr lang="en-GB" dirty="0"/>
+              <a:t>Annotating the Videos</a:t>
+            </a:r>
+          </a:p>
+        </p:txBody>
+      </p:sp>
+      <p:pic>
+        <p:nvPicPr>
+          <p:cNvPr id="6" name="Content Placeholder 5">
+            <a:extLst>
+              <a:ext uri="{FF2B5EF4-FFF2-40B4-BE49-F238E27FC236}">
+                <a16:creationId xmlns:a16="http://schemas.microsoft.com/office/drawing/2014/main" id="{A2207589-2245-7C41-9766-10AD111B4AA6}"/>
+              </a:ext>
+            </a:extLst>
+          </p:cNvPr>
+          <p:cNvPicPr>
+            <a:picLocks noGrp="1" noChangeAspect="1"/>
+          </p:cNvPicPr>
+          <p:nvPr>
+            <p:ph idx="1"/>
+          </p:nvPr>
+        </p:nvPicPr>
+        <p:blipFill rotWithShape="1">
+          <a:blip r:embed="rId3"/>
+          <a:srcRect r="75528"/>
+          <a:stretch/>
+        </p:blipFill>
+        <p:spPr>
+          <a:xfrm>
+            <a:off x="6019800" y="1690688"/>
+            <a:ext cx="5334000" cy="3448276"/>
+          </a:xfrm>
+        </p:spPr>
+      </p:pic>
+      <p:sp>
+        <p:nvSpPr>
+          <p:cNvPr id="5" name="Slide Number Placeholder 4">
+            <a:extLst>
+              <a:ext uri="{FF2B5EF4-FFF2-40B4-BE49-F238E27FC236}">
+                <a16:creationId xmlns:a16="http://schemas.microsoft.com/office/drawing/2014/main" id="{05E4CF48-919C-CF4F-8BBC-E8485BD89857}"/>
+              </a:ext>
+            </a:extLst>
+          </p:cNvPr>
+          <p:cNvSpPr>
+            <a:spLocks noGrp="1"/>
+          </p:cNvSpPr>
+          <p:nvPr>
+            <p:ph type="sldNum" sz="quarter" idx="12"/>
+          </p:nvPr>
+        </p:nvSpPr>
+        <p:spPr/>
+        <p:txBody>
+          <a:bodyPr/>
+          <a:lstStyle/>
+          <a:p>
+            <a:fld id="{1EF241A2-0DEB-384D-A4D9-E11D0A62C4FD}" type="slidenum">
+              <a:rPr lang="en-GB" smtClean="0"/>
+              <a:t>7</a:t>
+            </a:fld>
+            <a:endParaRPr lang="en-GB"/>
+          </a:p>
+        </p:txBody>
+      </p:sp>
+      <p:sp>
+        <p:nvSpPr>
+          <p:cNvPr id="7" name="Content Placeholder 2">
+            <a:extLst>
+              <a:ext uri="{FF2B5EF4-FFF2-40B4-BE49-F238E27FC236}">
+                <a16:creationId xmlns:a16="http://schemas.microsoft.com/office/drawing/2014/main" id="{7D673BF3-9B80-2247-8A36-2AD20A6B9A29}"/>
+              </a:ext>
+            </a:extLst>
+          </p:cNvPr>
+          <p:cNvSpPr txBox="1">
+            <a:spLocks/>
+          </p:cNvSpPr>
+          <p:nvPr/>
+        </p:nvSpPr>
+        <p:spPr>
+          <a:xfrm>
+            <a:off x="838200" y="1825624"/>
+            <a:ext cx="5181600" cy="3564911"/>
+          </a:xfrm>
+          <a:prstGeom prst="rect">
+            <a:avLst/>
+          </a:prstGeom>
+        </p:spPr>
+        <p:txBody>
+          <a:bodyPr vert="horz" lIns="91440" tIns="45720" rIns="91440" bIns="45720" rtlCol="0" anchor="ctr">
+            <a:normAutofit/>
+          </a:bodyPr>
+          <a:lstStyle>
+            <a:lvl1pPr marL="228600" indent="-228600" algn="l" defTabSz="914400" rtl="0" eaLnBrk="1" latinLnBrk="0" hangingPunct="1">
+              <a:lnSpc>
+                <a:spcPct val="90000"/>
+              </a:lnSpc>
+              <a:spcBef>
+                <a:spcPts val="1000"/>
+              </a:spcBef>
+              <a:buFont typeface="Arial" panose="020B0604020202020204" pitchFamily="34" charset="0"/>
+              <a:buChar char="•"/>
+              <a:defRPr sz="2800" kern="1200">
+                <a:solidFill>
+                  <a:schemeClr val="tx1"/>
+                </a:solidFill>
+                <a:latin typeface="TT Commons" panose="02000506030000020004" pitchFamily="2" charset="77"/>
+                <a:ea typeface="+mn-ea"/>
+                <a:cs typeface="+mn-cs"/>
+              </a:defRPr>
+            </a:lvl1pPr>
+            <a:lvl2pPr marL="685800" indent="-228600" algn="l" defTabSz="914400" rtl="0" eaLnBrk="1" latinLnBrk="0" hangingPunct="1">
+              <a:lnSpc>
+                <a:spcPct val="90000"/>
+              </a:lnSpc>
+              <a:spcBef>
+                <a:spcPts val="500"/>
+              </a:spcBef>
+              <a:buFont typeface="Arial" panose="020B0604020202020204" pitchFamily="34" charset="0"/>
+              <a:buChar char="•"/>
+              <a:defRPr sz="2400" kern="1200">
+                <a:solidFill>
+                  <a:schemeClr val="tx1"/>
+                </a:solidFill>
+                <a:latin typeface="TT Commons" panose="02000506030000020004" pitchFamily="2" charset="77"/>
+                <a:ea typeface="+mn-ea"/>
+                <a:cs typeface="+mn-cs"/>
+              </a:defRPr>
+            </a:lvl2pPr>
+            <a:lvl3pPr marL="1143000" indent="-228600" algn="l" defTabSz="914400" rtl="0" eaLnBrk="1" latinLnBrk="0" hangingPunct="1">
+              <a:lnSpc>
+                <a:spcPct val="90000"/>
+              </a:lnSpc>
+              <a:spcBef>
+                <a:spcPts val="500"/>
+              </a:spcBef>
+              <a:buFont typeface="Arial" panose="020B0604020202020204" pitchFamily="34" charset="0"/>
+              <a:buChar char="•"/>
+              <a:defRPr sz="2000" kern="1200">
+                <a:solidFill>
+                  <a:schemeClr val="tx1"/>
+                </a:solidFill>
+                <a:latin typeface="TT Commons" panose="02000506030000020004" pitchFamily="2" charset="77"/>
+                <a:ea typeface="+mn-ea"/>
+                <a:cs typeface="+mn-cs"/>
+              </a:defRPr>
+            </a:lvl3pPr>
+            <a:lvl4pPr marL="1600200" indent="-228600" algn="l" defTabSz="914400" rtl="0" eaLnBrk="1" latinLnBrk="0" hangingPunct="1">
+              <a:lnSpc>
+                <a:spcPct val="90000"/>
+              </a:lnSpc>
+              <a:spcBef>
+                <a:spcPts val="500"/>
+              </a:spcBef>
+              <a:buFont typeface="Arial" panose="020B0604020202020204" pitchFamily="34" charset="0"/>
+              <a:buChar char="•"/>
+              <a:defRPr sz="1800" kern="1200">
+                <a:solidFill>
+                  <a:schemeClr val="tx1"/>
+                </a:solidFill>
+                <a:latin typeface="TT Commons" panose="02000506030000020004" pitchFamily="2" charset="77"/>
+                <a:ea typeface="+mn-ea"/>
+                <a:cs typeface="+mn-cs"/>
+              </a:defRPr>
+            </a:lvl4pPr>
+            <a:lvl5pPr marL="2057400" indent="-228600" algn="l" defTabSz="914400" rtl="0" eaLnBrk="1" latinLnBrk="0" hangingPunct="1">
+              <a:lnSpc>
+                <a:spcPct val="90000"/>
+              </a:lnSpc>
+              <a:spcBef>
+                <a:spcPts val="500"/>
+              </a:spcBef>
+              <a:buFont typeface="Arial" panose="020B0604020202020204" pitchFamily="34" charset="0"/>
+              <a:buChar char="•"/>
+              <a:defRPr sz="1800" kern="1200">
+                <a:solidFill>
+                  <a:schemeClr val="tx1"/>
+                </a:solidFill>
+                <a:latin typeface="TT Commons" panose="02000506030000020004" pitchFamily="2" charset="77"/>
+                <a:ea typeface="+mn-ea"/>
+                <a:cs typeface="+mn-cs"/>
+              </a:defRPr>
+            </a:lvl5pPr>
+            <a:lvl6pPr marL="2514600" indent="-228600" algn="l" defTabSz="914400" rtl="0" eaLnBrk="1" latinLnBrk="0" hangingPunct="1">
+              <a:lnSpc>
+                <a:spcPct val="90000"/>
+              </a:lnSpc>
+              <a:spcBef>
+                <a:spcPts val="500"/>
+              </a:spcBef>
+              <a:buFont typeface="Arial" panose="020B0604020202020204" pitchFamily="34" charset="0"/>
+              <a:buChar char="•"/>
+              <a:defRPr sz="1800" kern="1200">
+                <a:solidFill>
+                  <a:schemeClr val="tx1"/>
+                </a:solidFill>
+                <a:latin typeface="+mn-lt"/>
+                <a:ea typeface="+mn-ea"/>
+                <a:cs typeface="+mn-cs"/>
+              </a:defRPr>
+            </a:lvl6pPr>
+            <a:lvl7pPr marL="2971800" indent="-228600" algn="l" defTabSz="914400" rtl="0" eaLnBrk="1" latinLnBrk="0" hangingPunct="1">
+              <a:lnSpc>
+                <a:spcPct val="90000"/>
+              </a:lnSpc>
+              <a:spcBef>
+                <a:spcPts val="500"/>
+              </a:spcBef>
+              <a:buFont typeface="Arial" panose="020B0604020202020204" pitchFamily="34" charset="0"/>
+              <a:buChar char="•"/>
+              <a:defRPr sz="1800" kern="1200">
+                <a:solidFill>
+                  <a:schemeClr val="tx1"/>
+                </a:solidFill>
+                <a:latin typeface="+mn-lt"/>
+                <a:ea typeface="+mn-ea"/>
+                <a:cs typeface="+mn-cs"/>
+              </a:defRPr>
+            </a:lvl7pPr>
+            <a:lvl8pPr marL="3429000" indent="-228600" algn="l" defTabSz="914400" rtl="0" eaLnBrk="1" latinLnBrk="0" hangingPunct="1">
+              <a:lnSpc>
+                <a:spcPct val="90000"/>
+              </a:lnSpc>
+              <a:spcBef>
+                <a:spcPts val="500"/>
+              </a:spcBef>
+              <a:buFont typeface="Arial" panose="020B0604020202020204" pitchFamily="34" charset="0"/>
+              <a:buChar char="•"/>
+              <a:defRPr sz="1800" kern="1200">
+                <a:solidFill>
+                  <a:schemeClr val="tx1"/>
+                </a:solidFill>
+                <a:latin typeface="+mn-lt"/>
+                <a:ea typeface="+mn-ea"/>
+                <a:cs typeface="+mn-cs"/>
+              </a:defRPr>
+            </a:lvl8pPr>
+            <a:lvl9pPr marL="3886200" indent="-228600" algn="l" defTabSz="914400" rtl="0" eaLnBrk="1" latinLnBrk="0" hangingPunct="1">
+              <a:lnSpc>
+                <a:spcPct val="90000"/>
+              </a:lnSpc>
+              <a:spcBef>
+                <a:spcPts val="500"/>
+              </a:spcBef>
+              <a:buFont typeface="Arial" panose="020B0604020202020204" pitchFamily="34" charset="0"/>
+              <a:buChar char="•"/>
+              <a:defRPr sz="1800" kern="1200">
+                <a:solidFill>
+                  <a:schemeClr val="tx1"/>
+                </a:solidFill>
+                <a:latin typeface="+mn-lt"/>
+                <a:ea typeface="+mn-ea"/>
+                <a:cs typeface="+mn-cs"/>
+              </a:defRPr>
+            </a:lvl9pPr>
+          </a:lstStyle>
+          <a:p>
+            <a:r>
+              <a:rPr lang="en-GB" dirty="0"/>
+              <a:t>intervals</a:t>
+            </a:r>
+          </a:p>
+          <a:p>
+            <a:r>
+              <a:rPr lang="en-GB" dirty="0"/>
+              <a:t>intervals of different modalities</a:t>
+            </a:r>
+          </a:p>
+          <a:p>
+            <a:r>
+              <a:rPr lang="en-GB" dirty="0"/>
+              <a:t>modalities of different sources</a:t>
+            </a:r>
+          </a:p>
+        </p:txBody>
+      </p:sp>
+    </p:spTree>
+    <p:extLst>
+      <p:ext uri="{BB962C8B-B14F-4D97-AF65-F5344CB8AC3E}">
+        <p14:creationId xmlns:p14="http://schemas.microsoft.com/office/powerpoint/2010/main" val="3201182402"/>
+      </p:ext>
+    </p:extLst>
+  </p:cSld>
+  <p:clrMapOvr>
+    <a:masterClrMapping/>
+  </p:clrMapOvr>
+</p:sld>
+</file>
+
+<file path=ppt/slides/slide8.xml><?xml version="1.0" encoding="utf-8"?>
+<p:sld xmlns:a="http://schemas.openxmlformats.org/drawingml/2006/main" xmlns:r="http://schemas.openxmlformats.org/officeDocument/2006/relationships" xmlns:p="http://schemas.openxmlformats.org/presentationml/2006/main">
+  <p:cSld>
+    <p:spTree>
+      <p:nvGrpSpPr>
+        <p:cNvPr id="1" name=""/>
+        <p:cNvGrpSpPr/>
+        <p:nvPr/>
+      </p:nvGrpSpPr>
+      <p:grpSpPr>
+        <a:xfrm>
+          <a:off x="0" y="0"/>
+          <a:ext cx="0" cy="0"/>
+          <a:chOff x="0" y="0"/>
+          <a:chExt cx="0" cy="0"/>
+        </a:xfrm>
+      </p:grpSpPr>
+      <p:sp>
+        <p:nvSpPr>
+          <p:cNvPr id="2" name="Title 1">
+            <a:extLst>
+              <a:ext uri="{FF2B5EF4-FFF2-40B4-BE49-F238E27FC236}">
+                <a16:creationId xmlns:a16="http://schemas.microsoft.com/office/drawing/2014/main" id="{B59301A2-9C61-8C4D-ACB8-F7A1CDCDAC91}"/>
+              </a:ext>
+            </a:extLst>
+          </p:cNvPr>
+          <p:cNvSpPr>
+            <a:spLocks noGrp="1"/>
+          </p:cNvSpPr>
+          <p:nvPr>
+            <p:ph type="title"/>
+          </p:nvPr>
+        </p:nvSpPr>
+        <p:spPr/>
+        <p:txBody>
+          <a:bodyPr/>
+          <a:lstStyle/>
+          <a:p>
+            <a:r>
+              <a:rPr lang="en-GB" dirty="0"/>
               <a:t>What counts as a rule?</a:t>
             </a:r>
+            <a:r>
+              <a:rPr lang="en-GB" baseline="30000" dirty="0">
+                <a:sym typeface="Wingdings" pitchFamily="2" charset="2"/>
+              </a:rPr>
+              <a:t>[1]</a:t>
+            </a:r>
+            <a:endParaRPr lang="en-GB" dirty="0"/>
           </a:p>
         </p:txBody>
       </p:sp>
@@ -5085,9 +6994,16 @@
             <p:ph sz="half" idx="1"/>
           </p:nvPr>
         </p:nvSpPr>
-        <p:spPr/>
-        <p:txBody>
-          <a:bodyPr/>
+        <p:spPr>
+          <a:xfrm>
+            <a:off x="838200" y="1825624"/>
+            <a:ext cx="5181600" cy="3564911"/>
+          </a:xfrm>
+        </p:spPr>
+        <p:txBody>
+          <a:bodyPr>
+            <a:normAutofit/>
+          </a:bodyPr>
           <a:lstStyle/>
           <a:p>
             <a:pPr marL="0" indent="0">
@@ -5103,12 +7019,9 @@
               </a:rPr>
               <a:t> B represents one of two cases:</a:t>
             </a:r>
-            <a:r>
-              <a:rPr lang="en-GB" baseline="30000" dirty="0">
-                <a:sym typeface="Wingdings" pitchFamily="2" charset="2"/>
-              </a:rPr>
-              <a:t>[1]</a:t>
-            </a:r>
+            <a:endParaRPr lang="en-GB" baseline="30000" dirty="0">
+              <a:sym typeface="Wingdings" pitchFamily="2" charset="2"/>
+            </a:endParaRPr>
           </a:p>
           <a:p>
             <a:pPr marL="514350" indent="-514350">
@@ -5217,7 +7130,7 @@
           <a:p>
             <a:fld id="{1EF241A2-0DEB-384D-A4D9-E11D0A62C4FD}" type="slidenum">
               <a:rPr lang="en-GB" smtClean="0"/>
-              <a:t>7</a:t>
+              <a:t>8</a:t>
             </a:fld>
             <a:endParaRPr lang="en-GB" dirty="0"/>
           </a:p>
@@ -5326,7 +7239,7 @@
 </p:sld>
 </file>
 
-<file path=ppt/slides/slide8.xml><?xml version="1.0" encoding="utf-8"?>
+<file path=ppt/slides/slide9.xml><?xml version="1.0" encoding="utf-8"?>
 <p:sld xmlns:a="http://schemas.openxmlformats.org/drawingml/2006/main" xmlns:r="http://schemas.openxmlformats.org/officeDocument/2006/relationships" xmlns:p="http://schemas.openxmlformats.org/presentationml/2006/main">
   <p:cSld>
     <p:spTree>
@@ -5556,7 +7469,7 @@
             </p:nvSpPr>
             <p:spPr>
               <a:blipFill>
-                <a:blip r:embed="rId2"/>
+                <a:blip r:embed="rId3"/>
                 <a:stretch>
                   <a:fillRect l="-1956" t="-2632"/>
                 </a:stretch>
@@ -5600,7 +7513,7 @@
           <a:p>
             <a:fld id="{1EF241A2-0DEB-384D-A4D9-E11D0A62C4FD}" type="slidenum">
               <a:rPr lang="en-GB" smtClean="0"/>
-              <a:t>8</a:t>
+              <a:t>9</a:t>
             </a:fld>
             <a:endParaRPr lang="en-GB" dirty="0"/>
           </a:p>
@@ -5621,7 +7534,7 @@
           <p:nvPr/>
         </p:nvPicPr>
         <p:blipFill>
-          <a:blip r:embed="rId3"/>
+          <a:blip r:embed="rId4"/>
           <a:stretch>
             <a:fillRect/>
           </a:stretch>
@@ -5646,236 +7559,6 @@
   <p:clrMapOvr>
     <a:masterClrMapping/>
   </p:clrMapOvr>
-</p:sld>
-</file>
-
-<file path=ppt/slides/slide9.xml><?xml version="1.0" encoding="utf-8"?>
-<p:sld xmlns:a="http://schemas.openxmlformats.org/drawingml/2006/main" xmlns:r="http://schemas.openxmlformats.org/officeDocument/2006/relationships" xmlns:p="http://schemas.openxmlformats.org/presentationml/2006/main">
-  <p:cSld>
-    <p:spTree>
-      <p:nvGrpSpPr>
-        <p:cNvPr id="1" name=""/>
-        <p:cNvGrpSpPr/>
-        <p:nvPr/>
-      </p:nvGrpSpPr>
-      <p:grpSpPr>
-        <a:xfrm>
-          <a:off x="0" y="0"/>
-          <a:ext cx="0" cy="0"/>
-          <a:chOff x="0" y="0"/>
-          <a:chExt cx="0" cy="0"/>
-        </a:xfrm>
-      </p:grpSpPr>
-      <p:sp>
-        <p:nvSpPr>
-          <p:cNvPr id="2" name="Title 1">
-            <a:extLst>
-              <a:ext uri="{FF2B5EF4-FFF2-40B4-BE49-F238E27FC236}">
-                <a16:creationId xmlns:a16="http://schemas.microsoft.com/office/drawing/2014/main" id="{8BA98A31-BCA9-0E4B-86B7-F453EB0FEC2F}"/>
-              </a:ext>
-            </a:extLst>
-          </p:cNvPr>
-          <p:cNvSpPr>
-            <a:spLocks noGrp="1"/>
-          </p:cNvSpPr>
-          <p:nvPr>
-            <p:ph type="title"/>
-          </p:nvPr>
-        </p:nvSpPr>
-        <p:spPr>
-          <a:xfrm>
-            <a:off x="831850" y="1709739"/>
-            <a:ext cx="10515600" cy="1059588"/>
-          </a:xfrm>
-        </p:spPr>
-        <p:txBody>
-          <a:bodyPr anchor="ctr"/>
-          <a:lstStyle/>
-          <a:p>
-            <a:pPr algn="ctr"/>
-            <a:r>
-              <a:rPr lang="en-GB" dirty="0"/>
-              <a:t>Why Significance?</a:t>
-            </a:r>
-          </a:p>
-        </p:txBody>
-      </p:sp>
-      <p:sp>
-        <p:nvSpPr>
-          <p:cNvPr id="4" name="Slide Number Placeholder 3">
-            <a:extLst>
-              <a:ext uri="{FF2B5EF4-FFF2-40B4-BE49-F238E27FC236}">
-                <a16:creationId xmlns:a16="http://schemas.microsoft.com/office/drawing/2014/main" id="{65771944-544F-694A-A9E6-376191B2C6AC}"/>
-              </a:ext>
-            </a:extLst>
-          </p:cNvPr>
-          <p:cNvSpPr>
-            <a:spLocks noGrp="1"/>
-          </p:cNvSpPr>
-          <p:nvPr>
-            <p:ph type="sldNum" sz="quarter" idx="12"/>
-          </p:nvPr>
-        </p:nvSpPr>
-        <p:spPr/>
-        <p:txBody>
-          <a:bodyPr/>
-          <a:lstStyle/>
-          <a:p>
-            <a:fld id="{1EF241A2-0DEB-384D-A4D9-E11D0A62C4FD}" type="slidenum">
-              <a:rPr lang="en-GB" smtClean="0"/>
-              <a:t>9</a:t>
-            </a:fld>
-            <a:endParaRPr lang="en-GB"/>
-          </a:p>
-        </p:txBody>
-      </p:sp>
-      <p:sp>
-        <p:nvSpPr>
-          <p:cNvPr id="5" name="Rounded Rectangle 4">
-            <a:extLst>
-              <a:ext uri="{FF2B5EF4-FFF2-40B4-BE49-F238E27FC236}">
-                <a16:creationId xmlns:a16="http://schemas.microsoft.com/office/drawing/2014/main" id="{93D8AB72-55D5-F74E-8328-67A096269ED4}"/>
-              </a:ext>
-            </a:extLst>
-          </p:cNvPr>
-          <p:cNvSpPr/>
-          <p:nvPr/>
-        </p:nvSpPr>
-        <p:spPr>
-          <a:xfrm>
-            <a:off x="1724297" y="3866605"/>
-            <a:ext cx="8730706" cy="914400"/>
-          </a:xfrm>
-          <a:prstGeom prst="roundRect">
-            <a:avLst/>
-          </a:prstGeom>
-          <a:noFill/>
-          <a:ln>
-            <a:solidFill>
-              <a:schemeClr val="tx1"/>
-            </a:solidFill>
-          </a:ln>
-        </p:spPr>
-        <p:style>
-          <a:lnRef idx="2">
-            <a:schemeClr val="accent1">
-              <a:shade val="50000"/>
-            </a:schemeClr>
-          </a:lnRef>
-          <a:fillRef idx="1">
-            <a:schemeClr val="accent1"/>
-          </a:fillRef>
-          <a:effectRef idx="0">
-            <a:schemeClr val="accent1"/>
-          </a:effectRef>
-          <a:fontRef idx="minor">
-            <a:schemeClr val="lt1"/>
-          </a:fontRef>
-        </p:style>
-        <p:txBody>
-          <a:bodyPr rtlCol="0" anchor="ctr"/>
-          <a:lstStyle/>
-          <a:p>
-            <a:pPr algn="ctr"/>
-            <a:r>
-              <a:rPr lang="en-GB" sz="2800" dirty="0">
-                <a:solidFill>
-                  <a:schemeClr val="tx1"/>
-                </a:solidFill>
-              </a:rPr>
-              <a:t>qualitative						quantitative</a:t>
-            </a:r>
-          </a:p>
-        </p:txBody>
-      </p:sp>
-    </p:spTree>
-    <p:extLst>
-      <p:ext uri="{BB962C8B-B14F-4D97-AF65-F5344CB8AC3E}">
-        <p14:creationId xmlns:p14="http://schemas.microsoft.com/office/powerpoint/2010/main" val="4284484028"/>
-      </p:ext>
-    </p:extLst>
-  </p:cSld>
-  <p:clrMapOvr>
-    <a:masterClrMapping/>
-  </p:clrMapOvr>
-  <p:timing>
-    <p:tnLst>
-      <p:par>
-        <p:cTn id="1" dur="indefinite" restart="never" nodeType="tmRoot">
-          <p:childTnLst>
-            <p:seq concurrent="1" nextAc="seek">
-              <p:cTn id="2" dur="indefinite" nodeType="mainSeq">
-                <p:childTnLst>
-                  <p:par>
-                    <p:cTn id="3" fill="hold">
-                      <p:stCondLst>
-                        <p:cond delay="indefinite"/>
-                      </p:stCondLst>
-                      <p:childTnLst>
-                        <p:par>
-                          <p:cTn id="4" fill="hold">
-                            <p:stCondLst>
-                              <p:cond delay="0"/>
-                            </p:stCondLst>
-                            <p:childTnLst>
-                              <p:par>
-                                <p:cTn id="5" presetID="1" presetClass="entr" presetSubtype="0" fill="hold" grpId="0" nodeType="clickEffect">
-                                  <p:stCondLst>
-                                    <p:cond delay="0"/>
-                                  </p:stCondLst>
-                                  <p:childTnLst>
-                                    <p:set>
-                                      <p:cBhvr>
-                                        <p:cTn id="6" dur="1" fill="hold">
-                                          <p:stCondLst>
-                                            <p:cond delay="0"/>
-                                          </p:stCondLst>
-                                        </p:cTn>
-                                        <p:tgtEl>
-                                          <p:spTgt spid="5"/>
-                                        </p:tgtEl>
-                                        <p:attrNameLst>
-                                          <p:attrName>style.visibility</p:attrName>
-                                        </p:attrNameLst>
-                                      </p:cBhvr>
-                                      <p:to>
-                                        <p:strVal val="visible"/>
-                                      </p:to>
-                                    </p:set>
-                                  </p:childTnLst>
-                                </p:cTn>
-                              </p:par>
-                            </p:childTnLst>
-                          </p:cTn>
-                        </p:par>
-                      </p:childTnLst>
-                    </p:cTn>
-                  </p:par>
-                </p:childTnLst>
-              </p:cTn>
-              <p:prevCondLst>
-                <p:cond evt="onPrev" delay="0">
-                  <p:tgtEl>
-                    <p:sldTgt/>
-                  </p:tgtEl>
-                </p:cond>
-              </p:prevCondLst>
-              <p:nextCondLst>
-                <p:cond evt="onNext" delay="0">
-                  <p:tgtEl>
-                    <p:sldTgt/>
-                  </p:tgtEl>
-                </p:cond>
-              </p:nextCondLst>
-            </p:seq>
-          </p:childTnLst>
-        </p:cTn>
-      </p:par>
-    </p:tnLst>
-    <p:bldLst>
-      <p:bldP spid="5" grpId="0" animBg="1"/>
-    </p:bldLst>
-  </p:timing>
 </p:sld>
 </file>
 

</xml_diff>